<commit_message>
updated presentation thingy (not finished)
</commit_message>
<xml_diff>
--- a/NotiFree.pptx
+++ b/NotiFree.pptx
@@ -578,7 +578,7 @@
   <p:cSld>
     <p:spTree>
       <p:nvGrpSpPr>
-        <p:cNvPr id="68" name="Shape 68"/>
+        <p:cNvPr id="69" name="Shape 69"/>
         <p:cNvGrpSpPr/>
         <p:nvPr/>
       </p:nvGrpSpPr>
@@ -592,7 +592,7 @@
       </p:grpSpPr>
       <p:sp>
         <p:nvSpPr>
-          <p:cNvPr id="69" name="Shape 69"/>
+          <p:cNvPr id="70" name="Shape 70"/>
           <p:cNvSpPr/>
           <p:nvPr>
             <p:ph idx="2" type="sldImg"/>
@@ -626,7 +626,7 @@
       </p:sp>
       <p:sp>
         <p:nvSpPr>
-          <p:cNvPr id="70" name="Shape 70"/>
+          <p:cNvPr id="71" name="Shape 71"/>
           <p:cNvSpPr txBox="1"/>
           <p:nvPr>
             <p:ph idx="1" type="body"/>
@@ -673,7 +673,7 @@
   <p:cSld>
     <p:spTree>
       <p:nvGrpSpPr>
-        <p:cNvPr id="74" name="Shape 74"/>
+        <p:cNvPr id="75" name="Shape 75"/>
         <p:cNvGrpSpPr/>
         <p:nvPr/>
       </p:nvGrpSpPr>
@@ -687,7 +687,7 @@
       </p:grpSpPr>
       <p:sp>
         <p:nvSpPr>
-          <p:cNvPr id="75" name="Shape 75"/>
+          <p:cNvPr id="76" name="Shape 76"/>
           <p:cNvSpPr/>
           <p:nvPr>
             <p:ph idx="2" type="sldImg"/>
@@ -721,7 +721,7 @@
       </p:sp>
       <p:sp>
         <p:nvSpPr>
-          <p:cNvPr id="76" name="Shape 76"/>
+          <p:cNvPr id="77" name="Shape 77"/>
           <p:cNvSpPr txBox="1"/>
           <p:nvPr>
             <p:ph idx="1" type="body"/>
@@ -768,7 +768,7 @@
   <p:cSld>
     <p:spTree>
       <p:nvGrpSpPr>
-        <p:cNvPr id="80" name="Shape 80"/>
+        <p:cNvPr id="81" name="Shape 81"/>
         <p:cNvGrpSpPr/>
         <p:nvPr/>
       </p:nvGrpSpPr>
@@ -782,7 +782,7 @@
       </p:grpSpPr>
       <p:sp>
         <p:nvSpPr>
-          <p:cNvPr id="81" name="Shape 81"/>
+          <p:cNvPr id="82" name="Shape 82"/>
           <p:cNvSpPr/>
           <p:nvPr>
             <p:ph idx="2" type="sldImg"/>
@@ -816,7 +816,7 @@
       </p:sp>
       <p:sp>
         <p:nvSpPr>
-          <p:cNvPr id="82" name="Shape 82"/>
+          <p:cNvPr id="83" name="Shape 83"/>
           <p:cNvSpPr txBox="1"/>
           <p:nvPr>
             <p:ph idx="1" type="body"/>
@@ -863,7 +863,7 @@
   <p:cSld>
     <p:spTree>
       <p:nvGrpSpPr>
-        <p:cNvPr id="86" name="Shape 86"/>
+        <p:cNvPr id="87" name="Shape 87"/>
         <p:cNvGrpSpPr/>
         <p:nvPr/>
       </p:nvGrpSpPr>
@@ -877,7 +877,7 @@
       </p:grpSpPr>
       <p:sp>
         <p:nvSpPr>
-          <p:cNvPr id="87" name="Shape 87"/>
+          <p:cNvPr id="88" name="Shape 88"/>
           <p:cNvSpPr/>
           <p:nvPr>
             <p:ph idx="2" type="sldImg"/>
@@ -911,7 +911,7 @@
       </p:sp>
       <p:sp>
         <p:nvSpPr>
-          <p:cNvPr id="88" name="Shape 88"/>
+          <p:cNvPr id="89" name="Shape 89"/>
           <p:cNvSpPr txBox="1"/>
           <p:nvPr>
             <p:ph idx="1" type="body"/>
@@ -958,7 +958,7 @@
   <p:cSld>
     <p:spTree>
       <p:nvGrpSpPr>
-        <p:cNvPr id="92" name="Shape 92"/>
+        <p:cNvPr id="93" name="Shape 93"/>
         <p:cNvGrpSpPr/>
         <p:nvPr/>
       </p:nvGrpSpPr>
@@ -972,7 +972,7 @@
       </p:grpSpPr>
       <p:sp>
         <p:nvSpPr>
-          <p:cNvPr id="93" name="Shape 93"/>
+          <p:cNvPr id="94" name="Shape 94"/>
           <p:cNvSpPr/>
           <p:nvPr>
             <p:ph idx="2" type="sldImg"/>
@@ -1006,7 +1006,7 @@
       </p:sp>
       <p:sp>
         <p:nvSpPr>
-          <p:cNvPr id="94" name="Shape 94"/>
+          <p:cNvPr id="95" name="Shape 95"/>
           <p:cNvSpPr txBox="1"/>
           <p:nvPr>
             <p:ph idx="1" type="body"/>
@@ -4928,43 +4928,68 @@
           </a:bodyPr>
           <a:lstStyle/>
           <a:p>
-            <a:pPr lvl="0" rtl="0" algn="just">
-              <a:spcBef>
-                <a:spcPts val="0"/>
-              </a:spcBef>
-              <a:buNone/>
+            <a:pPr indent="-228600" lvl="0" marL="457200" rtl="0" algn="just">
+              <a:spcBef>
+                <a:spcPts val="0"/>
+              </a:spcBef>
             </a:pPr>
             <a:r>
               <a:rPr lang="en"/>
-              <a:t>NotiFree is a search engine for free items in your area. It pulls results from Gumtree and Freecycle, allowing the user to browse through them all. It also sends the user notifications when an item they have recently been looking for becomes available.</a:t>
+              <a:t>It is a search engine</a:t>
             </a:r>
           </a:p>
           <a:p>
-            <a:pPr lvl="0" rtl="0" algn="just">
-              <a:spcBef>
-                <a:spcPts val="0"/>
-              </a:spcBef>
-              <a:buNone/>
-            </a:pPr>
-            <a:r>
-              <a:t/>
-            </a:r>
-            <a:endParaRPr/>
-          </a:p>
-          <a:p>
-            <a:pPr lvl="0" algn="just">
-              <a:spcBef>
-                <a:spcPts val="0"/>
-              </a:spcBef>
-              <a:buNone/>
+            <a:pPr indent="-228600" lvl="0" marL="457200" rtl="0" algn="just">
+              <a:spcBef>
+                <a:spcPts val="0"/>
+              </a:spcBef>
             </a:pPr>
             <a:r>
               <a:rPr lang="en"/>
-              <a:t>(describe notification system)</a:t>
+              <a:t>It pulls together results from different sites</a:t>
+            </a:r>
+          </a:p>
+          <a:p>
+            <a:pPr indent="-228600" lvl="0" marL="457200" rtl="0" algn="just">
+              <a:spcBef>
+                <a:spcPts val="0"/>
+              </a:spcBef>
+            </a:pPr>
+            <a:r>
+              <a:rPr lang="en"/>
+              <a:t>Sends notifications to user</a:t>
             </a:r>
           </a:p>
         </p:txBody>
       </p:sp>
+      <p:pic>
+        <p:nvPicPr>
+          <p:cNvPr descr="upload.png" id="68" name="Shape 68"/>
+          <p:cNvPicPr preferRelativeResize="0"/>
+          <p:nvPr/>
+        </p:nvPicPr>
+        <p:blipFill>
+          <a:blip r:embed="rId3">
+            <a:alphaModFix/>
+          </a:blip>
+          <a:stretch>
+            <a:fillRect/>
+          </a:stretch>
+        </p:blipFill>
+        <p:spPr>
+          <a:xfrm>
+            <a:off x="3560702" y="1969399"/>
+            <a:ext cx="5583297" cy="3174099"/>
+          </a:xfrm>
+          <a:prstGeom prst="rect">
+            <a:avLst/>
+          </a:prstGeom>
+          <a:noFill/>
+          <a:ln>
+            <a:noFill/>
+          </a:ln>
+        </p:spPr>
+      </p:pic>
     </p:spTree>
   </p:cSld>
   <p:clrMapOvr>
@@ -4978,7 +5003,7 @@
   <p:cSld>
     <p:spTree>
       <p:nvGrpSpPr>
-        <p:cNvPr id="71" name="Shape 71"/>
+        <p:cNvPr id="72" name="Shape 72"/>
         <p:cNvGrpSpPr/>
         <p:nvPr/>
       </p:nvGrpSpPr>
@@ -4992,7 +5017,7 @@
       </p:grpSpPr>
       <p:sp>
         <p:nvSpPr>
-          <p:cNvPr id="72" name="Shape 72"/>
+          <p:cNvPr id="73" name="Shape 73"/>
           <p:cNvSpPr txBox="1"/>
           <p:nvPr>
             <p:ph type="title"/>
@@ -5028,7 +5053,7 @@
       </p:sp>
       <p:sp>
         <p:nvSpPr>
-          <p:cNvPr id="73" name="Shape 73"/>
+          <p:cNvPr id="74" name="Shape 74"/>
           <p:cNvSpPr txBox="1"/>
           <p:nvPr>
             <p:ph idx="1" type="body"/>
@@ -5087,7 +5112,7 @@
   <p:cSld>
     <p:spTree>
       <p:nvGrpSpPr>
-        <p:cNvPr id="77" name="Shape 77"/>
+        <p:cNvPr id="78" name="Shape 78"/>
         <p:cNvGrpSpPr/>
         <p:nvPr/>
       </p:nvGrpSpPr>
@@ -5101,7 +5126,7 @@
       </p:grpSpPr>
       <p:sp>
         <p:nvSpPr>
-          <p:cNvPr id="78" name="Shape 78"/>
+          <p:cNvPr id="79" name="Shape 79"/>
           <p:cNvSpPr txBox="1"/>
           <p:nvPr>
             <p:ph type="title"/>
@@ -5137,7 +5162,7 @@
       </p:sp>
       <p:sp>
         <p:nvSpPr>
-          <p:cNvPr id="79" name="Shape 79"/>
+          <p:cNvPr id="80" name="Shape 80"/>
           <p:cNvSpPr txBox="1"/>
           <p:nvPr>
             <p:ph idx="1" type="body"/>
@@ -5184,7 +5209,7 @@
   <p:cSld>
     <p:spTree>
       <p:nvGrpSpPr>
-        <p:cNvPr id="83" name="Shape 83"/>
+        <p:cNvPr id="84" name="Shape 84"/>
         <p:cNvGrpSpPr/>
         <p:nvPr/>
       </p:nvGrpSpPr>
@@ -5198,7 +5223,7 @@
       </p:grpSpPr>
       <p:sp>
         <p:nvSpPr>
-          <p:cNvPr id="84" name="Shape 84"/>
+          <p:cNvPr id="85" name="Shape 85"/>
           <p:cNvSpPr txBox="1"/>
           <p:nvPr>
             <p:ph type="title"/>
@@ -5234,7 +5259,7 @@
       </p:sp>
       <p:sp>
         <p:nvSpPr>
-          <p:cNvPr id="85" name="Shape 85"/>
+          <p:cNvPr id="86" name="Shape 86"/>
           <p:cNvSpPr txBox="1"/>
           <p:nvPr>
             <p:ph idx="1" type="body"/>
@@ -5281,7 +5306,7 @@
   <p:cSld>
     <p:spTree>
       <p:nvGrpSpPr>
-        <p:cNvPr id="89" name="Shape 89"/>
+        <p:cNvPr id="90" name="Shape 90"/>
         <p:cNvGrpSpPr/>
         <p:nvPr/>
       </p:nvGrpSpPr>
@@ -5295,7 +5320,7 @@
       </p:grpSpPr>
       <p:sp>
         <p:nvSpPr>
-          <p:cNvPr id="90" name="Shape 90"/>
+          <p:cNvPr id="91" name="Shape 91"/>
           <p:cNvSpPr txBox="1"/>
           <p:nvPr>
             <p:ph type="title"/>
@@ -5331,7 +5356,7 @@
       </p:sp>
       <p:sp>
         <p:nvSpPr>
-          <p:cNvPr id="91" name="Shape 91"/>
+          <p:cNvPr id="92" name="Shape 92"/>
           <p:cNvSpPr txBox="1"/>
           <p:nvPr>
             <p:ph idx="1" type="body"/>
@@ -5398,6 +5423,42 @@
               <a:rPr lang="en"/>
               <a:t>Lewis - using GitHub, SQL + PHP</a:t>
             </a:r>
+          </a:p>
+          <a:p>
+            <a:pPr lvl="0">
+              <a:spcBef>
+                <a:spcPts val="0"/>
+              </a:spcBef>
+              <a:buNone/>
+            </a:pPr>
+            <a:r>
+              <a:t/>
+            </a:r>
+            <a:endParaRPr/>
+          </a:p>
+          <a:p>
+            <a:pPr lvl="0">
+              <a:spcBef>
+                <a:spcPts val="0"/>
+              </a:spcBef>
+              <a:buNone/>
+            </a:pPr>
+            <a:r>
+              <a:t/>
+            </a:r>
+            <a:endParaRPr/>
+          </a:p>
+          <a:p>
+            <a:pPr lvl="0">
+              <a:spcBef>
+                <a:spcPts val="0"/>
+              </a:spcBef>
+              <a:buNone/>
+            </a:pPr>
+            <a:r>
+              <a:t/>
+            </a:r>
+            <a:endParaRPr/>
           </a:p>
         </p:txBody>
       </p:sp>
@@ -5414,7 +5475,7 @@
   <p:cSld>
     <p:spTree>
       <p:nvGrpSpPr>
-        <p:cNvPr id="95" name="Shape 95"/>
+        <p:cNvPr id="96" name="Shape 96"/>
         <p:cNvGrpSpPr/>
         <p:nvPr/>
       </p:nvGrpSpPr>
@@ -5428,7 +5489,7 @@
       </p:grpSpPr>
       <p:sp>
         <p:nvSpPr>
-          <p:cNvPr id="96" name="Shape 96"/>
+          <p:cNvPr id="97" name="Shape 97"/>
           <p:cNvSpPr txBox="1"/>
           <p:nvPr>
             <p:ph type="title"/>
@@ -5464,7 +5525,7 @@
       </p:sp>
       <p:sp>
         <p:nvSpPr>
-          <p:cNvPr id="97" name="Shape 97"/>
+          <p:cNvPr id="98" name="Shape 98"/>
           <p:cNvSpPr txBox="1"/>
           <p:nvPr>
             <p:ph idx="1" type="body"/>

</xml_diff>

<commit_message>
updated powerpoint (backup screenshots still need to be updated)
</commit_message>
<xml_diff>
--- a/NotiFree.pptx
+++ b/NotiFree.pptx
@@ -15,18 +15,23 @@
     <p:sldId id="260" r:id="rId9"/>
     <p:sldId id="261" r:id="rId10"/>
     <p:sldId id="262" r:id="rId11"/>
+    <p:sldId id="263" r:id="rId12"/>
+    <p:sldId id="264" r:id="rId13"/>
+    <p:sldId id="265" r:id="rId14"/>
+    <p:sldId id="266" r:id="rId15"/>
+    <p:sldId id="267" r:id="rId16"/>
   </p:sldIdLst>
   <p:sldSz cy="5143500" cx="9144000"/>
   <p:notesSz cx="6858000" cy="9144000"/>
   <p:embeddedFontLst>
     <p:embeddedFont>
       <p:font typeface="Average"/>
-      <p:regular r:id="rId12"/>
+      <p:regular r:id="rId17"/>
     </p:embeddedFont>
     <p:embeddedFont>
       <p:font typeface="Oswald"/>
-      <p:regular r:id="rId13"/>
-      <p:bold r:id="rId14"/>
+      <p:regular r:id="rId18"/>
+      <p:bold r:id="rId19"/>
     </p:embeddedFont>
   </p:embeddedFontLst>
   <p:defaultTextStyle>
@@ -478,12 +483,12 @@
 </p:notes>
 </file>
 
-<file path=ppt/notesSlides/notesSlide2.xml><?xml version="1.0" encoding="utf-8"?>
+<file path=ppt/notesSlides/notesSlide10.xml><?xml version="1.0" encoding="utf-8"?>
 <p:notes xmlns:a="http://schemas.openxmlformats.org/drawingml/2006/main" xmlns:r="http://schemas.openxmlformats.org/officeDocument/2006/relationships" xmlns:mc="http://schemas.openxmlformats.org/markup-compatibility/2006" xmlns:mv="urn:schemas-microsoft-com:mac:vml" xmlns:p="http://schemas.openxmlformats.org/presentationml/2006/main" xmlns:c="http://schemas.openxmlformats.org/drawingml/2006/chart" xmlns:dgm="http://schemas.openxmlformats.org/drawingml/2006/diagram" xmlns:o="urn:schemas-microsoft-com:office:office" xmlns:v="urn:schemas-microsoft-com:vml" xmlns:pvml="urn:schemas-microsoft-com:office:powerpoint" xmlns:com="http://schemas.openxmlformats.org/drawingml/2006/compatibility" xmlns:p14="http://schemas.microsoft.com/office/powerpoint/2010/main" showMasterPhAnim="0" showMasterSp="0">
   <p:cSld>
     <p:spTree>
       <p:nvGrpSpPr>
-        <p:cNvPr id="62" name="Shape 62"/>
+        <p:cNvPr id="114" name="Shape 114"/>
         <p:cNvGrpSpPr/>
         <p:nvPr/>
       </p:nvGrpSpPr>
@@ -497,7 +502,7 @@
       </p:grpSpPr>
       <p:sp>
         <p:nvSpPr>
-          <p:cNvPr id="63" name="Shape 63"/>
+          <p:cNvPr id="115" name="Shape 115"/>
           <p:cNvSpPr/>
           <p:nvPr>
             <p:ph idx="2" type="sldImg"/>
@@ -531,7 +536,7 @@
       </p:sp>
       <p:sp>
         <p:nvSpPr>
-          <p:cNvPr id="64" name="Shape 64"/>
+          <p:cNvPr id="116" name="Shape 116"/>
           <p:cNvSpPr txBox="1"/>
           <p:nvPr>
             <p:ph idx="1" type="body"/>
@@ -573,12 +578,12 @@
 </p:notes>
 </file>
 
-<file path=ppt/notesSlides/notesSlide3.xml><?xml version="1.0" encoding="utf-8"?>
+<file path=ppt/notesSlides/notesSlide11.xml><?xml version="1.0" encoding="utf-8"?>
 <p:notes xmlns:a="http://schemas.openxmlformats.org/drawingml/2006/main" xmlns:r="http://schemas.openxmlformats.org/officeDocument/2006/relationships" xmlns:mc="http://schemas.openxmlformats.org/markup-compatibility/2006" xmlns:mv="urn:schemas-microsoft-com:mac:vml" xmlns:p="http://schemas.openxmlformats.org/presentationml/2006/main" xmlns:c="http://schemas.openxmlformats.org/drawingml/2006/chart" xmlns:dgm="http://schemas.openxmlformats.org/drawingml/2006/diagram" xmlns:o="urn:schemas-microsoft-com:office:office" xmlns:v="urn:schemas-microsoft-com:vml" xmlns:pvml="urn:schemas-microsoft-com:office:powerpoint" xmlns:com="http://schemas.openxmlformats.org/drawingml/2006/compatibility" xmlns:p14="http://schemas.microsoft.com/office/powerpoint/2010/main" showMasterPhAnim="0" showMasterSp="0">
   <p:cSld>
     <p:spTree>
       <p:nvGrpSpPr>
-        <p:cNvPr id="69" name="Shape 69"/>
+        <p:cNvPr id="121" name="Shape 121"/>
         <p:cNvGrpSpPr/>
         <p:nvPr/>
       </p:nvGrpSpPr>
@@ -592,7 +597,7 @@
       </p:grpSpPr>
       <p:sp>
         <p:nvSpPr>
-          <p:cNvPr id="70" name="Shape 70"/>
+          <p:cNvPr id="122" name="Shape 122"/>
           <p:cNvSpPr/>
           <p:nvPr>
             <p:ph idx="2" type="sldImg"/>
@@ -626,7 +631,292 @@
       </p:sp>
       <p:sp>
         <p:nvSpPr>
-          <p:cNvPr id="71" name="Shape 71"/>
+          <p:cNvPr id="123" name="Shape 123"/>
+          <p:cNvSpPr txBox="1"/>
+          <p:nvPr>
+            <p:ph idx="1" type="body"/>
+          </p:nvPr>
+        </p:nvSpPr>
+        <p:spPr>
+          <a:xfrm>
+            <a:off x="685800" y="4343400"/>
+            <a:ext cx="5486400" cy="4114800"/>
+          </a:xfrm>
+          <a:prstGeom prst="rect">
+            <a:avLst/>
+          </a:prstGeom>
+        </p:spPr>
+        <p:txBody>
+          <a:bodyPr anchorCtr="0" anchor="t" bIns="91425" lIns="91425" rIns="91425" tIns="91425">
+            <a:noAutofit/>
+          </a:bodyPr>
+          <a:lstStyle/>
+          <a:p>
+            <a:pPr lvl="0">
+              <a:spcBef>
+                <a:spcPts val="0"/>
+              </a:spcBef>
+              <a:buNone/>
+            </a:pPr>
+            <a:r>
+              <a:t/>
+            </a:r>
+            <a:endParaRPr/>
+          </a:p>
+        </p:txBody>
+      </p:sp>
+    </p:spTree>
+  </p:cSld>
+  <p:clrMapOvr>
+    <a:masterClrMapping/>
+  </p:clrMapOvr>
+</p:notes>
+</file>
+
+<file path=ppt/notesSlides/notesSlide12.xml><?xml version="1.0" encoding="utf-8"?>
+<p:notes xmlns:a="http://schemas.openxmlformats.org/drawingml/2006/main" xmlns:r="http://schemas.openxmlformats.org/officeDocument/2006/relationships" xmlns:mc="http://schemas.openxmlformats.org/markup-compatibility/2006" xmlns:mv="urn:schemas-microsoft-com:mac:vml" xmlns:p="http://schemas.openxmlformats.org/presentationml/2006/main" xmlns:c="http://schemas.openxmlformats.org/drawingml/2006/chart" xmlns:dgm="http://schemas.openxmlformats.org/drawingml/2006/diagram" xmlns:o="urn:schemas-microsoft-com:office:office" xmlns:v="urn:schemas-microsoft-com:vml" xmlns:pvml="urn:schemas-microsoft-com:office:powerpoint" xmlns:com="http://schemas.openxmlformats.org/drawingml/2006/compatibility" xmlns:p14="http://schemas.microsoft.com/office/powerpoint/2010/main" showMasterPhAnim="0" showMasterSp="0">
+  <p:cSld>
+    <p:spTree>
+      <p:nvGrpSpPr>
+        <p:cNvPr id="128" name="Shape 128"/>
+        <p:cNvGrpSpPr/>
+        <p:nvPr/>
+      </p:nvGrpSpPr>
+      <p:grpSpPr>
+        <a:xfrm>
+          <a:off x="0" y="0"/>
+          <a:ext cx="0" cy="0"/>
+          <a:chOff x="0" y="0"/>
+          <a:chExt cx="0" cy="0"/>
+        </a:xfrm>
+      </p:grpSpPr>
+      <p:sp>
+        <p:nvSpPr>
+          <p:cNvPr id="129" name="Shape 129"/>
+          <p:cNvSpPr/>
+          <p:nvPr>
+            <p:ph idx="2" type="sldImg"/>
+          </p:nvPr>
+        </p:nvSpPr>
+        <p:spPr>
+          <a:xfrm>
+            <a:off x="381300" y="685800"/>
+            <a:ext cx="6096000" cy="3429000"/>
+          </a:xfrm>
+          <a:custGeom>
+            <a:pathLst>
+              <a:path extrusionOk="0" h="120000" w="120000">
+                <a:moveTo>
+                  <a:pt x="0" y="0"/>
+                </a:moveTo>
+                <a:lnTo>
+                  <a:pt x="120000" y="0"/>
+                </a:lnTo>
+                <a:lnTo>
+                  <a:pt x="120000" y="120000"/>
+                </a:lnTo>
+                <a:lnTo>
+                  <a:pt x="0" y="120000"/>
+                </a:lnTo>
+                <a:close/>
+              </a:path>
+            </a:pathLst>
+          </a:custGeom>
+        </p:spPr>
+      </p:sp>
+      <p:sp>
+        <p:nvSpPr>
+          <p:cNvPr id="130" name="Shape 130"/>
+          <p:cNvSpPr txBox="1"/>
+          <p:nvPr>
+            <p:ph idx="1" type="body"/>
+          </p:nvPr>
+        </p:nvSpPr>
+        <p:spPr>
+          <a:xfrm>
+            <a:off x="685800" y="4343400"/>
+            <a:ext cx="5486400" cy="4114800"/>
+          </a:xfrm>
+          <a:prstGeom prst="rect">
+            <a:avLst/>
+          </a:prstGeom>
+        </p:spPr>
+        <p:txBody>
+          <a:bodyPr anchorCtr="0" anchor="t" bIns="91425" lIns="91425" rIns="91425" tIns="91425">
+            <a:noAutofit/>
+          </a:bodyPr>
+          <a:lstStyle/>
+          <a:p>
+            <a:pPr lvl="0">
+              <a:spcBef>
+                <a:spcPts val="0"/>
+              </a:spcBef>
+              <a:buNone/>
+            </a:pPr>
+            <a:r>
+              <a:t/>
+            </a:r>
+            <a:endParaRPr/>
+          </a:p>
+        </p:txBody>
+      </p:sp>
+    </p:spTree>
+  </p:cSld>
+  <p:clrMapOvr>
+    <a:masterClrMapping/>
+  </p:clrMapOvr>
+</p:notes>
+</file>
+
+<file path=ppt/notesSlides/notesSlide2.xml><?xml version="1.0" encoding="utf-8"?>
+<p:notes xmlns:a="http://schemas.openxmlformats.org/drawingml/2006/main" xmlns:r="http://schemas.openxmlformats.org/officeDocument/2006/relationships" xmlns:mc="http://schemas.openxmlformats.org/markup-compatibility/2006" xmlns:mv="urn:schemas-microsoft-com:mac:vml" xmlns:p="http://schemas.openxmlformats.org/presentationml/2006/main" xmlns:c="http://schemas.openxmlformats.org/drawingml/2006/chart" xmlns:dgm="http://schemas.openxmlformats.org/drawingml/2006/diagram" xmlns:o="urn:schemas-microsoft-com:office:office" xmlns:v="urn:schemas-microsoft-com:vml" xmlns:pvml="urn:schemas-microsoft-com:office:powerpoint" xmlns:com="http://schemas.openxmlformats.org/drawingml/2006/compatibility" xmlns:p14="http://schemas.microsoft.com/office/powerpoint/2010/main" showMasterPhAnim="0" showMasterSp="0">
+  <p:cSld>
+    <p:spTree>
+      <p:nvGrpSpPr>
+        <p:cNvPr id="62" name="Shape 62"/>
+        <p:cNvGrpSpPr/>
+        <p:nvPr/>
+      </p:nvGrpSpPr>
+      <p:grpSpPr>
+        <a:xfrm>
+          <a:off x="0" y="0"/>
+          <a:ext cx="0" cy="0"/>
+          <a:chOff x="0" y="0"/>
+          <a:chExt cx="0" cy="0"/>
+        </a:xfrm>
+      </p:grpSpPr>
+      <p:sp>
+        <p:nvSpPr>
+          <p:cNvPr id="63" name="Shape 63"/>
+          <p:cNvSpPr/>
+          <p:nvPr>
+            <p:ph idx="2" type="sldImg"/>
+          </p:nvPr>
+        </p:nvSpPr>
+        <p:spPr>
+          <a:xfrm>
+            <a:off x="381300" y="685800"/>
+            <a:ext cx="6096000" cy="3429000"/>
+          </a:xfrm>
+          <a:custGeom>
+            <a:pathLst>
+              <a:path extrusionOk="0" h="120000" w="120000">
+                <a:moveTo>
+                  <a:pt x="0" y="0"/>
+                </a:moveTo>
+                <a:lnTo>
+                  <a:pt x="120000" y="0"/>
+                </a:lnTo>
+                <a:lnTo>
+                  <a:pt x="120000" y="120000"/>
+                </a:lnTo>
+                <a:lnTo>
+                  <a:pt x="0" y="120000"/>
+                </a:lnTo>
+                <a:close/>
+              </a:path>
+            </a:pathLst>
+          </a:custGeom>
+        </p:spPr>
+      </p:sp>
+      <p:sp>
+        <p:nvSpPr>
+          <p:cNvPr id="64" name="Shape 64"/>
+          <p:cNvSpPr txBox="1"/>
+          <p:nvPr>
+            <p:ph idx="1" type="body"/>
+          </p:nvPr>
+        </p:nvSpPr>
+        <p:spPr>
+          <a:xfrm>
+            <a:off x="685800" y="4343400"/>
+            <a:ext cx="5486400" cy="4114800"/>
+          </a:xfrm>
+          <a:prstGeom prst="rect">
+            <a:avLst/>
+          </a:prstGeom>
+        </p:spPr>
+        <p:txBody>
+          <a:bodyPr anchorCtr="0" anchor="t" bIns="91425" lIns="91425" rIns="91425" tIns="91425">
+            <a:noAutofit/>
+          </a:bodyPr>
+          <a:lstStyle/>
+          <a:p>
+            <a:pPr lvl="0">
+              <a:spcBef>
+                <a:spcPts val="0"/>
+              </a:spcBef>
+              <a:buNone/>
+            </a:pPr>
+            <a:r>
+              <a:t/>
+            </a:r>
+            <a:endParaRPr/>
+          </a:p>
+        </p:txBody>
+      </p:sp>
+    </p:spTree>
+  </p:cSld>
+  <p:clrMapOvr>
+    <a:masterClrMapping/>
+  </p:clrMapOvr>
+</p:notes>
+</file>
+
+<file path=ppt/notesSlides/notesSlide3.xml><?xml version="1.0" encoding="utf-8"?>
+<p:notes xmlns:a="http://schemas.openxmlformats.org/drawingml/2006/main" xmlns:r="http://schemas.openxmlformats.org/officeDocument/2006/relationships" xmlns:mc="http://schemas.openxmlformats.org/markup-compatibility/2006" xmlns:mv="urn:schemas-microsoft-com:mac:vml" xmlns:p="http://schemas.openxmlformats.org/presentationml/2006/main" xmlns:c="http://schemas.openxmlformats.org/drawingml/2006/chart" xmlns:dgm="http://schemas.openxmlformats.org/drawingml/2006/diagram" xmlns:o="urn:schemas-microsoft-com:office:office" xmlns:v="urn:schemas-microsoft-com:vml" xmlns:pvml="urn:schemas-microsoft-com:office:powerpoint" xmlns:com="http://schemas.openxmlformats.org/drawingml/2006/compatibility" xmlns:p14="http://schemas.microsoft.com/office/powerpoint/2010/main" showMasterPhAnim="0" showMasterSp="0">
+  <p:cSld>
+    <p:spTree>
+      <p:nvGrpSpPr>
+        <p:cNvPr id="68" name="Shape 68"/>
+        <p:cNvGrpSpPr/>
+        <p:nvPr/>
+      </p:nvGrpSpPr>
+      <p:grpSpPr>
+        <a:xfrm>
+          <a:off x="0" y="0"/>
+          <a:ext cx="0" cy="0"/>
+          <a:chOff x="0" y="0"/>
+          <a:chExt cx="0" cy="0"/>
+        </a:xfrm>
+      </p:grpSpPr>
+      <p:sp>
+        <p:nvSpPr>
+          <p:cNvPr id="69" name="Shape 69"/>
+          <p:cNvSpPr/>
+          <p:nvPr>
+            <p:ph idx="2" type="sldImg"/>
+          </p:nvPr>
+        </p:nvSpPr>
+        <p:spPr>
+          <a:xfrm>
+            <a:off x="381300" y="685800"/>
+            <a:ext cx="6096000" cy="3429000"/>
+          </a:xfrm>
+          <a:custGeom>
+            <a:pathLst>
+              <a:path extrusionOk="0" h="120000" w="120000">
+                <a:moveTo>
+                  <a:pt x="0" y="0"/>
+                </a:moveTo>
+                <a:lnTo>
+                  <a:pt x="120000" y="0"/>
+                </a:lnTo>
+                <a:lnTo>
+                  <a:pt x="120000" y="120000"/>
+                </a:lnTo>
+                <a:lnTo>
+                  <a:pt x="0" y="120000"/>
+                </a:lnTo>
+                <a:close/>
+              </a:path>
+            </a:pathLst>
+          </a:custGeom>
+        </p:spPr>
+      </p:sp>
+      <p:sp>
+        <p:nvSpPr>
+          <p:cNvPr id="70" name="Shape 70"/>
           <p:cNvSpPr txBox="1"/>
           <p:nvPr>
             <p:ph idx="1" type="body"/>
@@ -1007,6 +1297,196 @@
       <p:sp>
         <p:nvSpPr>
           <p:cNvPr id="95" name="Shape 95"/>
+          <p:cNvSpPr txBox="1"/>
+          <p:nvPr>
+            <p:ph idx="1" type="body"/>
+          </p:nvPr>
+        </p:nvSpPr>
+        <p:spPr>
+          <a:xfrm>
+            <a:off x="685800" y="4343400"/>
+            <a:ext cx="5486400" cy="4114800"/>
+          </a:xfrm>
+          <a:prstGeom prst="rect">
+            <a:avLst/>
+          </a:prstGeom>
+        </p:spPr>
+        <p:txBody>
+          <a:bodyPr anchorCtr="0" anchor="t" bIns="91425" lIns="91425" rIns="91425" tIns="91425">
+            <a:noAutofit/>
+          </a:bodyPr>
+          <a:lstStyle/>
+          <a:p>
+            <a:pPr lvl="0">
+              <a:spcBef>
+                <a:spcPts val="0"/>
+              </a:spcBef>
+              <a:buNone/>
+            </a:pPr>
+            <a:r>
+              <a:t/>
+            </a:r>
+            <a:endParaRPr/>
+          </a:p>
+        </p:txBody>
+      </p:sp>
+    </p:spTree>
+  </p:cSld>
+  <p:clrMapOvr>
+    <a:masterClrMapping/>
+  </p:clrMapOvr>
+</p:notes>
+</file>
+
+<file path=ppt/notesSlides/notesSlide8.xml><?xml version="1.0" encoding="utf-8"?>
+<p:notes xmlns:a="http://schemas.openxmlformats.org/drawingml/2006/main" xmlns:r="http://schemas.openxmlformats.org/officeDocument/2006/relationships" xmlns:mc="http://schemas.openxmlformats.org/markup-compatibility/2006" xmlns:mv="urn:schemas-microsoft-com:mac:vml" xmlns:p="http://schemas.openxmlformats.org/presentationml/2006/main" xmlns:c="http://schemas.openxmlformats.org/drawingml/2006/chart" xmlns:dgm="http://schemas.openxmlformats.org/drawingml/2006/diagram" xmlns:o="urn:schemas-microsoft-com:office:office" xmlns:v="urn:schemas-microsoft-com:vml" xmlns:pvml="urn:schemas-microsoft-com:office:powerpoint" xmlns:com="http://schemas.openxmlformats.org/drawingml/2006/compatibility" xmlns:p14="http://schemas.microsoft.com/office/powerpoint/2010/main" showMasterPhAnim="0" showMasterSp="0">
+  <p:cSld>
+    <p:spTree>
+      <p:nvGrpSpPr>
+        <p:cNvPr id="100" name="Shape 100"/>
+        <p:cNvGrpSpPr/>
+        <p:nvPr/>
+      </p:nvGrpSpPr>
+      <p:grpSpPr>
+        <a:xfrm>
+          <a:off x="0" y="0"/>
+          <a:ext cx="0" cy="0"/>
+          <a:chOff x="0" y="0"/>
+          <a:chExt cx="0" cy="0"/>
+        </a:xfrm>
+      </p:grpSpPr>
+      <p:sp>
+        <p:nvSpPr>
+          <p:cNvPr id="101" name="Shape 101"/>
+          <p:cNvSpPr/>
+          <p:nvPr>
+            <p:ph idx="2" type="sldImg"/>
+          </p:nvPr>
+        </p:nvSpPr>
+        <p:spPr>
+          <a:xfrm>
+            <a:off x="381300" y="685800"/>
+            <a:ext cx="6096000" cy="3429000"/>
+          </a:xfrm>
+          <a:custGeom>
+            <a:pathLst>
+              <a:path extrusionOk="0" h="120000" w="120000">
+                <a:moveTo>
+                  <a:pt x="0" y="0"/>
+                </a:moveTo>
+                <a:lnTo>
+                  <a:pt x="120000" y="0"/>
+                </a:lnTo>
+                <a:lnTo>
+                  <a:pt x="120000" y="120000"/>
+                </a:lnTo>
+                <a:lnTo>
+                  <a:pt x="0" y="120000"/>
+                </a:lnTo>
+                <a:close/>
+              </a:path>
+            </a:pathLst>
+          </a:custGeom>
+        </p:spPr>
+      </p:sp>
+      <p:sp>
+        <p:nvSpPr>
+          <p:cNvPr id="102" name="Shape 102"/>
+          <p:cNvSpPr txBox="1"/>
+          <p:nvPr>
+            <p:ph idx="1" type="body"/>
+          </p:nvPr>
+        </p:nvSpPr>
+        <p:spPr>
+          <a:xfrm>
+            <a:off x="685800" y="4343400"/>
+            <a:ext cx="5486400" cy="4114800"/>
+          </a:xfrm>
+          <a:prstGeom prst="rect">
+            <a:avLst/>
+          </a:prstGeom>
+        </p:spPr>
+        <p:txBody>
+          <a:bodyPr anchorCtr="0" anchor="t" bIns="91425" lIns="91425" rIns="91425" tIns="91425">
+            <a:noAutofit/>
+          </a:bodyPr>
+          <a:lstStyle/>
+          <a:p>
+            <a:pPr lvl="0">
+              <a:spcBef>
+                <a:spcPts val="0"/>
+              </a:spcBef>
+              <a:buNone/>
+            </a:pPr>
+            <a:r>
+              <a:t/>
+            </a:r>
+            <a:endParaRPr/>
+          </a:p>
+        </p:txBody>
+      </p:sp>
+    </p:spTree>
+  </p:cSld>
+  <p:clrMapOvr>
+    <a:masterClrMapping/>
+  </p:clrMapOvr>
+</p:notes>
+</file>
+
+<file path=ppt/notesSlides/notesSlide9.xml><?xml version="1.0" encoding="utf-8"?>
+<p:notes xmlns:a="http://schemas.openxmlformats.org/drawingml/2006/main" xmlns:r="http://schemas.openxmlformats.org/officeDocument/2006/relationships" xmlns:mc="http://schemas.openxmlformats.org/markup-compatibility/2006" xmlns:mv="urn:schemas-microsoft-com:mac:vml" xmlns:p="http://schemas.openxmlformats.org/presentationml/2006/main" xmlns:c="http://schemas.openxmlformats.org/drawingml/2006/chart" xmlns:dgm="http://schemas.openxmlformats.org/drawingml/2006/diagram" xmlns:o="urn:schemas-microsoft-com:office:office" xmlns:v="urn:schemas-microsoft-com:vml" xmlns:pvml="urn:schemas-microsoft-com:office:powerpoint" xmlns:com="http://schemas.openxmlformats.org/drawingml/2006/compatibility" xmlns:p14="http://schemas.microsoft.com/office/powerpoint/2010/main" showMasterPhAnim="0" showMasterSp="0">
+  <p:cSld>
+    <p:spTree>
+      <p:nvGrpSpPr>
+        <p:cNvPr id="107" name="Shape 107"/>
+        <p:cNvGrpSpPr/>
+        <p:nvPr/>
+      </p:nvGrpSpPr>
+      <p:grpSpPr>
+        <a:xfrm>
+          <a:off x="0" y="0"/>
+          <a:ext cx="0" cy="0"/>
+          <a:chOff x="0" y="0"/>
+          <a:chExt cx="0" cy="0"/>
+        </a:xfrm>
+      </p:grpSpPr>
+      <p:sp>
+        <p:nvSpPr>
+          <p:cNvPr id="108" name="Shape 108"/>
+          <p:cNvSpPr/>
+          <p:nvPr>
+            <p:ph idx="2" type="sldImg"/>
+          </p:nvPr>
+        </p:nvSpPr>
+        <p:spPr>
+          <a:xfrm>
+            <a:off x="381300" y="685800"/>
+            <a:ext cx="6096000" cy="3429000"/>
+          </a:xfrm>
+          <a:custGeom>
+            <a:pathLst>
+              <a:path extrusionOk="0" h="120000" w="120000">
+                <a:moveTo>
+                  <a:pt x="0" y="0"/>
+                </a:moveTo>
+                <a:lnTo>
+                  <a:pt x="120000" y="0"/>
+                </a:lnTo>
+                <a:lnTo>
+                  <a:pt x="120000" y="120000"/>
+                </a:lnTo>
+                <a:lnTo>
+                  <a:pt x="0" y="120000"/>
+                </a:lnTo>
+                <a:close/>
+              </a:path>
+            </a:pathLst>
+          </a:custGeom>
+        </p:spPr>
+      </p:sp>
+      <p:sp>
+        <p:nvSpPr>
+          <p:cNvPr id="109" name="Shape 109"/>
           <p:cNvSpPr txBox="1"/>
           <p:nvPr>
             <p:ph idx="1" type="body"/>
@@ -4852,6 +5332,389 @@
 </p:sld>
 </file>
 
+<file path=ppt/slides/slide10.xml><?xml version="1.0" encoding="utf-8"?>
+<p:sld xmlns:a="http://schemas.openxmlformats.org/drawingml/2006/main" xmlns:r="http://schemas.openxmlformats.org/officeDocument/2006/relationships" xmlns:mc="http://schemas.openxmlformats.org/markup-compatibility/2006" xmlns:mv="urn:schemas-microsoft-com:mac:vml" xmlns:p="http://schemas.openxmlformats.org/presentationml/2006/main" xmlns:c="http://schemas.openxmlformats.org/drawingml/2006/chart" xmlns:dgm="http://schemas.openxmlformats.org/drawingml/2006/diagram" xmlns:o="urn:schemas-microsoft-com:office:office" xmlns:v="urn:schemas-microsoft-com:vml" xmlns:pvml="urn:schemas-microsoft-com:office:powerpoint" xmlns:com="http://schemas.openxmlformats.org/drawingml/2006/compatibility" xmlns:p14="http://schemas.microsoft.com/office/powerpoint/2010/main">
+  <p:cSld>
+    <p:spTree>
+      <p:nvGrpSpPr>
+        <p:cNvPr id="117" name="Shape 117"/>
+        <p:cNvGrpSpPr/>
+        <p:nvPr/>
+      </p:nvGrpSpPr>
+      <p:grpSpPr>
+        <a:xfrm>
+          <a:off x="0" y="0"/>
+          <a:ext cx="0" cy="0"/>
+          <a:chOff x="0" y="0"/>
+          <a:chExt cx="0" cy="0"/>
+        </a:xfrm>
+      </p:grpSpPr>
+      <p:sp>
+        <p:nvSpPr>
+          <p:cNvPr id="118" name="Shape 118"/>
+          <p:cNvSpPr txBox="1"/>
+          <p:nvPr>
+            <p:ph type="title"/>
+          </p:nvPr>
+        </p:nvSpPr>
+        <p:spPr>
+          <a:xfrm>
+            <a:off x="311700" y="445025"/>
+            <a:ext cx="8520600" cy="572700"/>
+          </a:xfrm>
+          <a:prstGeom prst="rect">
+            <a:avLst/>
+          </a:prstGeom>
+        </p:spPr>
+        <p:txBody>
+          <a:bodyPr anchorCtr="0" anchor="t" bIns="91425" lIns="91425" rIns="91425" tIns="91425">
+            <a:noAutofit/>
+          </a:bodyPr>
+          <a:lstStyle/>
+          <a:p>
+            <a:pPr lvl="0">
+              <a:spcBef>
+                <a:spcPts val="0"/>
+              </a:spcBef>
+              <a:buNone/>
+            </a:pPr>
+            <a:r>
+              <a:t/>
+            </a:r>
+            <a:endParaRPr/>
+          </a:p>
+        </p:txBody>
+      </p:sp>
+      <p:sp>
+        <p:nvSpPr>
+          <p:cNvPr id="119" name="Shape 119"/>
+          <p:cNvSpPr txBox="1"/>
+          <p:nvPr>
+            <p:ph idx="1" type="body"/>
+          </p:nvPr>
+        </p:nvSpPr>
+        <p:spPr>
+          <a:xfrm>
+            <a:off x="311700" y="1152475"/>
+            <a:ext cx="8520600" cy="3416400"/>
+          </a:xfrm>
+          <a:prstGeom prst="rect">
+            <a:avLst/>
+          </a:prstGeom>
+        </p:spPr>
+        <p:txBody>
+          <a:bodyPr anchorCtr="0" anchor="t" bIns="91425" lIns="91425" rIns="91425" tIns="91425">
+            <a:noAutofit/>
+          </a:bodyPr>
+          <a:lstStyle/>
+          <a:p>
+            <a:pPr lvl="0">
+              <a:spcBef>
+                <a:spcPts val="0"/>
+              </a:spcBef>
+              <a:buNone/>
+            </a:pPr>
+            <a:r>
+              <a:t/>
+            </a:r>
+            <a:endParaRPr/>
+          </a:p>
+        </p:txBody>
+      </p:sp>
+      <p:pic>
+        <p:nvPicPr>
+          <p:cNvPr descr="upload2.png" id="120" name="Shape 120"/>
+          <p:cNvPicPr preferRelativeResize="0"/>
+          <p:nvPr/>
+        </p:nvPicPr>
+        <p:blipFill>
+          <a:blip r:embed="rId3">
+            <a:alphaModFix/>
+          </a:blip>
+          <a:stretch>
+            <a:fillRect/>
+          </a:stretch>
+        </p:blipFill>
+        <p:spPr>
+          <a:xfrm>
+            <a:off x="0" y="1042"/>
+            <a:ext cx="9144001" cy="5141416"/>
+          </a:xfrm>
+          <a:prstGeom prst="rect">
+            <a:avLst/>
+          </a:prstGeom>
+          <a:noFill/>
+          <a:ln>
+            <a:noFill/>
+          </a:ln>
+        </p:spPr>
+      </p:pic>
+    </p:spTree>
+  </p:cSld>
+  <p:clrMapOvr>
+    <a:masterClrMapping/>
+  </p:clrMapOvr>
+</p:sld>
+</file>
+
+<file path=ppt/slides/slide11.xml><?xml version="1.0" encoding="utf-8"?>
+<p:sld xmlns:a="http://schemas.openxmlformats.org/drawingml/2006/main" xmlns:r="http://schemas.openxmlformats.org/officeDocument/2006/relationships" xmlns:mc="http://schemas.openxmlformats.org/markup-compatibility/2006" xmlns:mv="urn:schemas-microsoft-com:mac:vml" xmlns:p="http://schemas.openxmlformats.org/presentationml/2006/main" xmlns:c="http://schemas.openxmlformats.org/drawingml/2006/chart" xmlns:dgm="http://schemas.openxmlformats.org/drawingml/2006/diagram" xmlns:o="urn:schemas-microsoft-com:office:office" xmlns:v="urn:schemas-microsoft-com:vml" xmlns:pvml="urn:schemas-microsoft-com:office:powerpoint" xmlns:com="http://schemas.openxmlformats.org/drawingml/2006/compatibility" xmlns:p14="http://schemas.microsoft.com/office/powerpoint/2010/main">
+  <p:cSld>
+    <p:spTree>
+      <p:nvGrpSpPr>
+        <p:cNvPr id="124" name="Shape 124"/>
+        <p:cNvGrpSpPr/>
+        <p:nvPr/>
+      </p:nvGrpSpPr>
+      <p:grpSpPr>
+        <a:xfrm>
+          <a:off x="0" y="0"/>
+          <a:ext cx="0" cy="0"/>
+          <a:chOff x="0" y="0"/>
+          <a:chExt cx="0" cy="0"/>
+        </a:xfrm>
+      </p:grpSpPr>
+      <p:sp>
+        <p:nvSpPr>
+          <p:cNvPr id="125" name="Shape 125"/>
+          <p:cNvSpPr txBox="1"/>
+          <p:nvPr>
+            <p:ph type="title"/>
+          </p:nvPr>
+        </p:nvSpPr>
+        <p:spPr>
+          <a:xfrm>
+            <a:off x="311700" y="445025"/>
+            <a:ext cx="8520600" cy="572700"/>
+          </a:xfrm>
+          <a:prstGeom prst="rect">
+            <a:avLst/>
+          </a:prstGeom>
+        </p:spPr>
+        <p:txBody>
+          <a:bodyPr anchorCtr="0" anchor="t" bIns="91425" lIns="91425" rIns="91425" tIns="91425">
+            <a:noAutofit/>
+          </a:bodyPr>
+          <a:lstStyle/>
+          <a:p>
+            <a:pPr lvl="0">
+              <a:spcBef>
+                <a:spcPts val="0"/>
+              </a:spcBef>
+              <a:buNone/>
+            </a:pPr>
+            <a:r>
+              <a:t/>
+            </a:r>
+            <a:endParaRPr/>
+          </a:p>
+        </p:txBody>
+      </p:sp>
+      <p:sp>
+        <p:nvSpPr>
+          <p:cNvPr id="126" name="Shape 126"/>
+          <p:cNvSpPr txBox="1"/>
+          <p:nvPr>
+            <p:ph idx="1" type="body"/>
+          </p:nvPr>
+        </p:nvSpPr>
+        <p:spPr>
+          <a:xfrm>
+            <a:off x="311700" y="1152475"/>
+            <a:ext cx="8520600" cy="3416400"/>
+          </a:xfrm>
+          <a:prstGeom prst="rect">
+            <a:avLst/>
+          </a:prstGeom>
+        </p:spPr>
+        <p:txBody>
+          <a:bodyPr anchorCtr="0" anchor="t" bIns="91425" lIns="91425" rIns="91425" tIns="91425">
+            <a:noAutofit/>
+          </a:bodyPr>
+          <a:lstStyle/>
+          <a:p>
+            <a:pPr lvl="0">
+              <a:spcBef>
+                <a:spcPts val="0"/>
+              </a:spcBef>
+              <a:buNone/>
+            </a:pPr>
+            <a:r>
+              <a:t/>
+            </a:r>
+            <a:endParaRPr/>
+          </a:p>
+        </p:txBody>
+      </p:sp>
+      <p:pic>
+        <p:nvPicPr>
+          <p:cNvPr descr="upload5.png" id="127" name="Shape 127"/>
+          <p:cNvPicPr preferRelativeResize="0"/>
+          <p:nvPr/>
+        </p:nvPicPr>
+        <p:blipFill>
+          <a:blip r:embed="rId3">
+            <a:alphaModFix/>
+          </a:blip>
+          <a:stretch>
+            <a:fillRect/>
+          </a:stretch>
+        </p:blipFill>
+        <p:spPr>
+          <a:xfrm>
+            <a:off x="6608" y="0"/>
+            <a:ext cx="9130784" cy="5143500"/>
+          </a:xfrm>
+          <a:prstGeom prst="rect">
+            <a:avLst/>
+          </a:prstGeom>
+          <a:noFill/>
+          <a:ln>
+            <a:noFill/>
+          </a:ln>
+        </p:spPr>
+      </p:pic>
+    </p:spTree>
+  </p:cSld>
+  <p:clrMapOvr>
+    <a:masterClrMapping/>
+  </p:clrMapOvr>
+</p:sld>
+</file>
+
+<file path=ppt/slides/slide12.xml><?xml version="1.0" encoding="utf-8"?>
+<p:sld xmlns:a="http://schemas.openxmlformats.org/drawingml/2006/main" xmlns:r="http://schemas.openxmlformats.org/officeDocument/2006/relationships" xmlns:mc="http://schemas.openxmlformats.org/markup-compatibility/2006" xmlns:mv="urn:schemas-microsoft-com:mac:vml" xmlns:p="http://schemas.openxmlformats.org/presentationml/2006/main" xmlns:c="http://schemas.openxmlformats.org/drawingml/2006/chart" xmlns:dgm="http://schemas.openxmlformats.org/drawingml/2006/diagram" xmlns:o="urn:schemas-microsoft-com:office:office" xmlns:v="urn:schemas-microsoft-com:vml" xmlns:pvml="urn:schemas-microsoft-com:office:powerpoint" xmlns:com="http://schemas.openxmlformats.org/drawingml/2006/compatibility" xmlns:p14="http://schemas.microsoft.com/office/powerpoint/2010/main">
+  <p:cSld>
+    <p:spTree>
+      <p:nvGrpSpPr>
+        <p:cNvPr id="131" name="Shape 131"/>
+        <p:cNvGrpSpPr/>
+        <p:nvPr/>
+      </p:nvGrpSpPr>
+      <p:grpSpPr>
+        <a:xfrm>
+          <a:off x="0" y="0"/>
+          <a:ext cx="0" cy="0"/>
+          <a:chOff x="0" y="0"/>
+          <a:chExt cx="0" cy="0"/>
+        </a:xfrm>
+      </p:grpSpPr>
+      <p:sp>
+        <p:nvSpPr>
+          <p:cNvPr id="132" name="Shape 132"/>
+          <p:cNvSpPr txBox="1"/>
+          <p:nvPr>
+            <p:ph type="title"/>
+          </p:nvPr>
+        </p:nvSpPr>
+        <p:spPr>
+          <a:xfrm>
+            <a:off x="311700" y="445025"/>
+            <a:ext cx="8520600" cy="572700"/>
+          </a:xfrm>
+          <a:prstGeom prst="rect">
+            <a:avLst/>
+          </a:prstGeom>
+        </p:spPr>
+        <p:txBody>
+          <a:bodyPr anchorCtr="0" anchor="t" bIns="91425" lIns="91425" rIns="91425" tIns="91425">
+            <a:noAutofit/>
+          </a:bodyPr>
+          <a:lstStyle/>
+          <a:p>
+            <a:pPr lvl="0">
+              <a:spcBef>
+                <a:spcPts val="0"/>
+              </a:spcBef>
+              <a:buNone/>
+            </a:pPr>
+            <a:r>
+              <a:t/>
+            </a:r>
+            <a:endParaRPr/>
+          </a:p>
+        </p:txBody>
+      </p:sp>
+      <p:sp>
+        <p:nvSpPr>
+          <p:cNvPr id="133" name="Shape 133"/>
+          <p:cNvSpPr txBox="1"/>
+          <p:nvPr>
+            <p:ph idx="1" type="body"/>
+          </p:nvPr>
+        </p:nvSpPr>
+        <p:spPr>
+          <a:xfrm>
+            <a:off x="311700" y="1152475"/>
+            <a:ext cx="8520600" cy="3416400"/>
+          </a:xfrm>
+          <a:prstGeom prst="rect">
+            <a:avLst/>
+          </a:prstGeom>
+        </p:spPr>
+        <p:txBody>
+          <a:bodyPr anchorCtr="0" anchor="t" bIns="91425" lIns="91425" rIns="91425" tIns="91425">
+            <a:noAutofit/>
+          </a:bodyPr>
+          <a:lstStyle/>
+          <a:p>
+            <a:pPr lvl="0">
+              <a:spcBef>
+                <a:spcPts val="0"/>
+              </a:spcBef>
+              <a:buNone/>
+            </a:pPr>
+            <a:r>
+              <a:rPr lang="en"/>
+              <a:t>Home - Harry</a:t>
+            </a:r>
+          </a:p>
+          <a:p>
+            <a:pPr lvl="0">
+              <a:spcBef>
+                <a:spcPts val="0"/>
+              </a:spcBef>
+              <a:buNone/>
+            </a:pPr>
+            <a:r>
+              <a:rPr lang="en"/>
+              <a:t>Sign up - Christina</a:t>
+            </a:r>
+          </a:p>
+          <a:p>
+            <a:pPr lvl="0">
+              <a:spcBef>
+                <a:spcPts val="0"/>
+              </a:spcBef>
+              <a:buNone/>
+            </a:pPr>
+            <a:r>
+              <a:rPr lang="en"/>
+              <a:t>Sign in + Results - David</a:t>
+            </a:r>
+          </a:p>
+          <a:p>
+            <a:pPr lvl="0" rtl="0">
+              <a:spcBef>
+                <a:spcPts val="0"/>
+              </a:spcBef>
+              <a:buNone/>
+            </a:pPr>
+            <a:r>
+              <a:rPr lang="en"/>
+              <a:t>Settings - Lewis</a:t>
+            </a:r>
+          </a:p>
+        </p:txBody>
+      </p:sp>
+    </p:spTree>
+  </p:cSld>
+  <p:clrMapOvr>
+    <a:masterClrMapping/>
+  </p:clrMapOvr>
+</p:sld>
+</file>
+
 <file path=ppt/slides/slide2.xml><?xml version="1.0" encoding="utf-8"?>
 <p:sld xmlns:a="http://schemas.openxmlformats.org/drawingml/2006/main" xmlns:r="http://schemas.openxmlformats.org/officeDocument/2006/relationships" xmlns:mc="http://schemas.openxmlformats.org/markup-compatibility/2006" xmlns:mv="urn:schemas-microsoft-com:mac:vml" xmlns:p="http://schemas.openxmlformats.org/presentationml/2006/main" xmlns:c="http://schemas.openxmlformats.org/drawingml/2006/chart" xmlns:dgm="http://schemas.openxmlformats.org/drawingml/2006/diagram" xmlns:o="urn:schemas-microsoft-com:office:office" xmlns:v="urn:schemas-microsoft-com:vml" xmlns:pvml="urn:schemas-microsoft-com:office:powerpoint" xmlns:com="http://schemas.openxmlformats.org/drawingml/2006/compatibility" xmlns:p14="http://schemas.microsoft.com/office/powerpoint/2010/main">
   <p:cSld>
@@ -4960,60 +5823,8 @@
               <a:t>Sends notifications to user</a:t>
             </a:r>
           </a:p>
-          <a:p>
-            <a:pPr lvl="0" rtl="0" algn="just">
-              <a:spcBef>
-                <a:spcPts val="0"/>
-              </a:spcBef>
-              <a:buNone/>
-            </a:pPr>
-            <a:r>
-              <a:rPr lang="en"/>
-              <a:t>NotiFree is a search engine for free items in your area. It pulls results from Gumtree and Freecycle, allowing the user to browse through them all. It also sends the user notifications when an item they have recently been looking for becomes available.</a:t>
-            </a:r>
-          </a:p>
-          <a:p>
-            <a:pPr lvl="0" rtl="0" algn="just">
-              <a:spcBef>
-                <a:spcPts val="0"/>
-              </a:spcBef>
-              <a:buNone/>
-            </a:pPr>
-            <a:r>
-              <a:rPr lang="en"/>
-              <a:t>(describe notification system)</a:t>
-            </a:r>
-          </a:p>
         </p:txBody>
       </p:sp>
-      <p:pic>
-        <p:nvPicPr>
-          <p:cNvPr descr="upload.png" id="68" name="Shape 68"/>
-          <p:cNvPicPr preferRelativeResize="0"/>
-          <p:nvPr/>
-        </p:nvPicPr>
-        <p:blipFill>
-          <a:blip r:embed="rId3">
-            <a:alphaModFix/>
-          </a:blip>
-          <a:stretch>
-            <a:fillRect/>
-          </a:stretch>
-        </p:blipFill>
-        <p:spPr>
-          <a:xfrm>
-            <a:off x="6075825" y="3399249"/>
-            <a:ext cx="3068173" cy="1744250"/>
-          </a:xfrm>
-          <a:prstGeom prst="rect">
-            <a:avLst/>
-          </a:prstGeom>
-          <a:noFill/>
-          <a:ln>
-            <a:noFill/>
-          </a:ln>
-        </p:spPr>
-      </p:pic>
     </p:spTree>
   </p:cSld>
   <p:clrMapOvr>
@@ -5027,7 +5838,7 @@
   <p:cSld>
     <p:spTree>
       <p:nvGrpSpPr>
-        <p:cNvPr id="72" name="Shape 72"/>
+        <p:cNvPr id="71" name="Shape 71"/>
         <p:cNvGrpSpPr/>
         <p:nvPr/>
       </p:nvGrpSpPr>
@@ -5041,7 +5852,7 @@
       </p:grpSpPr>
       <p:sp>
         <p:nvSpPr>
-          <p:cNvPr id="73" name="Shape 73"/>
+          <p:cNvPr id="72" name="Shape 72"/>
           <p:cNvSpPr txBox="1"/>
           <p:nvPr>
             <p:ph type="title"/>
@@ -5077,7 +5888,7 @@
       </p:sp>
       <p:sp>
         <p:nvSpPr>
-          <p:cNvPr id="74" name="Shape 74"/>
+          <p:cNvPr id="73" name="Shape 73"/>
           <p:cNvSpPr txBox="1"/>
           <p:nvPr>
             <p:ph idx="1" type="body"/>
@@ -5098,31 +5909,57 @@
           </a:bodyPr>
           <a:lstStyle/>
           <a:p>
-            <a:pPr lvl="0" rtl="0" algn="just">
-              <a:spcBef>
-                <a:spcPts val="0"/>
-              </a:spcBef>
-              <a:buNone/>
+            <a:pPr indent="-228600" lvl="0" marL="457200" rtl="0" algn="just">
+              <a:spcBef>
+                <a:spcPts val="0"/>
+              </a:spcBef>
             </a:pPr>
             <a:r>
               <a:rPr lang="en"/>
-              <a:t>NotiFree is designed to save users the trouble of searching through many different sites for an item. It enables the user to view the available items from both sites at once.</a:t>
+              <a:t>It saves the trouble of searching through multiple sites</a:t>
             </a:r>
           </a:p>
           <a:p>
-            <a:pPr lvl="0" algn="just">
-              <a:spcBef>
-                <a:spcPts val="0"/>
-              </a:spcBef>
-              <a:buNone/>
+            <a:pPr indent="-228600" lvl="0" marL="457200" rtl="0" algn="just">
+              <a:spcBef>
+                <a:spcPts val="0"/>
+              </a:spcBef>
             </a:pPr>
             <a:r>
               <a:rPr lang="en"/>
-              <a:t>The notification system also means that the user does not have to be constantly viewing the site to check what new items have become available, because they will receive an email whenever there is a new item related to their previous searches.</a:t>
+              <a:t>The user doesn’t have to be constantly checking the site for new items</a:t>
             </a:r>
           </a:p>
         </p:txBody>
       </p:sp>
+      <p:pic>
+        <p:nvPicPr>
+          <p:cNvPr descr="Screen Shot 2016-08-11 at 15.06.01.png" id="74" name="Shape 74"/>
+          <p:cNvPicPr preferRelativeResize="0"/>
+          <p:nvPr/>
+        </p:nvPicPr>
+        <p:blipFill>
+          <a:blip r:embed="rId3">
+            <a:alphaModFix/>
+          </a:blip>
+          <a:stretch>
+            <a:fillRect/>
+          </a:stretch>
+        </p:blipFill>
+        <p:spPr>
+          <a:xfrm>
+            <a:off x="776275" y="2530525"/>
+            <a:ext cx="7591425" cy="2038350"/>
+          </a:xfrm>
+          <a:prstGeom prst="rect">
+            <a:avLst/>
+          </a:prstGeom>
+          <a:noFill/>
+          <a:ln>
+            <a:noFill/>
+          </a:ln>
+        </p:spPr>
+      </p:pic>
     </p:spTree>
   </p:cSld>
   <p:clrMapOvr>
@@ -5207,7 +6044,7 @@
           </a:bodyPr>
           <a:lstStyle/>
           <a:p>
-            <a:pPr lvl="0" algn="just">
+            <a:pPr lvl="0" rtl="0" algn="just">
               <a:spcBef>
                 <a:spcPts val="0"/>
               </a:spcBef>
@@ -5215,7 +6052,41 @@
             </a:pPr>
             <a:r>
               <a:rPr lang="en"/>
-              <a:t>The site is targeted towards someone who has just arrived in a new home, with no or relatively low income and may be working under time constraints. Take for example, a student. They would want furniture that is easy to access without searching through several different sites, they would want to be able to do it quickly, and without too much effort. However, they wouldn’t want to receive too many notifications or have to enter lots of personal information.</a:t>
+              <a:t>Targeted towards someone who:</a:t>
+            </a:r>
+          </a:p>
+          <a:p>
+            <a:pPr indent="-228600" lvl="0" marL="457200" rtl="0" algn="just">
+              <a:spcBef>
+                <a:spcPts val="0"/>
+              </a:spcBef>
+            </a:pPr>
+            <a:r>
+              <a:rPr lang="en"/>
+              <a:t>has just moved into a new home</a:t>
+            </a:r>
+          </a:p>
+          <a:p>
+            <a:pPr indent="-228600" lvl="0" marL="457200" rtl="0" algn="just">
+              <a:spcBef>
+                <a:spcPts val="0"/>
+              </a:spcBef>
+            </a:pPr>
+            <a:r>
+              <a:rPr lang="en"/>
+              <a:t>is struggling for money</a:t>
+            </a:r>
+          </a:p>
+          <a:p>
+            <a:pPr lvl="0" rtl="0" algn="just">
+              <a:spcBef>
+                <a:spcPts val="0"/>
+              </a:spcBef>
+              <a:buNone/>
+            </a:pPr>
+            <a:r>
+              <a:rPr lang="en"/>
+              <a:t>They would want quick and easy access, but they wouldn’t want to enter too many details or receive too many notifications.</a:t>
             </a:r>
           </a:p>
         </p:txBody>
@@ -5312,7 +6183,62 @@
             </a:pPr>
             <a:r>
               <a:rPr lang="en"/>
-              <a:t>The vast majority of our site is written in HTML, with PHP used for the servers. There was a small amount of javascript and a reasonable amount of python used for the scripting necessary to perform searches and dynamically affect HTML. We used CSS3 to style the website and create animations, such as the one on the home page.</a:t>
+              <a:t>Languages we used:</a:t>
+            </a:r>
+          </a:p>
+          <a:p>
+            <a:pPr indent="-228600" lvl="0" marL="457200" rtl="0" algn="just">
+              <a:spcBef>
+                <a:spcPts val="0"/>
+              </a:spcBef>
+            </a:pPr>
+            <a:r>
+              <a:rPr lang="en"/>
+              <a:t>HTML</a:t>
+            </a:r>
+          </a:p>
+          <a:p>
+            <a:pPr indent="-228600" lvl="0" marL="457200" rtl="0" algn="just">
+              <a:spcBef>
+                <a:spcPts val="0"/>
+              </a:spcBef>
+            </a:pPr>
+            <a:r>
+              <a:rPr lang="en"/>
+              <a:t>PHP</a:t>
+            </a:r>
+          </a:p>
+          <a:p>
+            <a:pPr indent="-228600" lvl="0" marL="457200" rtl="0" algn="just">
+              <a:spcBef>
+                <a:spcPts val="0"/>
+              </a:spcBef>
+            </a:pPr>
+            <a:r>
+              <a:rPr lang="en"/>
+              <a:t>Javascript</a:t>
+            </a:r>
+          </a:p>
+          <a:p>
+            <a:pPr indent="-228600" lvl="0" marL="457200" rtl="0" algn="just">
+              <a:spcBef>
+                <a:spcPts val="0"/>
+              </a:spcBef>
+            </a:pPr>
+            <a:r>
+              <a:rPr lang="en"/>
+              <a:t>Python</a:t>
+            </a:r>
+          </a:p>
+          <a:p>
+            <a:pPr indent="-228600" lvl="0" marL="457200" rtl="0" algn="just">
+              <a:spcBef>
+                <a:spcPts val="0"/>
+              </a:spcBef>
+            </a:pPr>
+            <a:r>
+              <a:rPr lang="en"/>
+              <a:t>CSS3</a:t>
             </a:r>
           </a:p>
         </p:txBody>
@@ -5409,7 +6335,7 @@
             </a:pPr>
             <a:r>
               <a:rPr lang="en"/>
-              <a:t>Harry - CSS3 (keyframes + gradients) + HTML5 forms</a:t>
+              <a:t>Harry - CSS3 keyframes + gradients + HTML5 forms</a:t>
             </a:r>
           </a:p>
           <a:p>
@@ -5577,10 +6503,87 @@
               <a:buNone/>
             </a:pPr>
             <a:r>
-              <a:rPr lang="en"/>
-              <a:t>Home - Harry</a:t>
+              <a:t/>
             </a:r>
+            <a:endParaRPr/>
           </a:p>
+        </p:txBody>
+      </p:sp>
+      <p:pic>
+        <p:nvPicPr>
+          <p:cNvPr descr="upload.png" id="99" name="Shape 99"/>
+          <p:cNvPicPr preferRelativeResize="0"/>
+          <p:nvPr/>
+        </p:nvPicPr>
+        <p:blipFill>
+          <a:blip r:embed="rId3">
+            <a:alphaModFix/>
+          </a:blip>
+          <a:stretch>
+            <a:fillRect/>
+          </a:stretch>
+        </p:blipFill>
+        <p:spPr>
+          <a:xfrm>
+            <a:off x="0" y="0"/>
+            <a:ext cx="9144000" cy="5198389"/>
+          </a:xfrm>
+          <a:prstGeom prst="rect">
+            <a:avLst/>
+          </a:prstGeom>
+          <a:noFill/>
+          <a:ln>
+            <a:noFill/>
+          </a:ln>
+        </p:spPr>
+      </p:pic>
+    </p:spTree>
+  </p:cSld>
+  <p:clrMapOvr>
+    <a:masterClrMapping/>
+  </p:clrMapOvr>
+</p:sld>
+</file>
+
+<file path=ppt/slides/slide8.xml><?xml version="1.0" encoding="utf-8"?>
+<p:sld xmlns:a="http://schemas.openxmlformats.org/drawingml/2006/main" xmlns:r="http://schemas.openxmlformats.org/officeDocument/2006/relationships" xmlns:mc="http://schemas.openxmlformats.org/markup-compatibility/2006" xmlns:mv="urn:schemas-microsoft-com:mac:vml" xmlns:p="http://schemas.openxmlformats.org/presentationml/2006/main" xmlns:c="http://schemas.openxmlformats.org/drawingml/2006/chart" xmlns:dgm="http://schemas.openxmlformats.org/drawingml/2006/diagram" xmlns:o="urn:schemas-microsoft-com:office:office" xmlns:v="urn:schemas-microsoft-com:vml" xmlns:pvml="urn:schemas-microsoft-com:office:powerpoint" xmlns:com="http://schemas.openxmlformats.org/drawingml/2006/compatibility" xmlns:p14="http://schemas.microsoft.com/office/powerpoint/2010/main">
+  <p:cSld>
+    <p:spTree>
+      <p:nvGrpSpPr>
+        <p:cNvPr id="103" name="Shape 103"/>
+        <p:cNvGrpSpPr/>
+        <p:nvPr/>
+      </p:nvGrpSpPr>
+      <p:grpSpPr>
+        <a:xfrm>
+          <a:off x="0" y="0"/>
+          <a:ext cx="0" cy="0"/>
+          <a:chOff x="0" y="0"/>
+          <a:chExt cx="0" cy="0"/>
+        </a:xfrm>
+      </p:grpSpPr>
+      <p:sp>
+        <p:nvSpPr>
+          <p:cNvPr id="104" name="Shape 104"/>
+          <p:cNvSpPr txBox="1"/>
+          <p:nvPr>
+            <p:ph type="title"/>
+          </p:nvPr>
+        </p:nvSpPr>
+        <p:spPr>
+          <a:xfrm>
+            <a:off x="311700" y="445025"/>
+            <a:ext cx="8520600" cy="572700"/>
+          </a:xfrm>
+          <a:prstGeom prst="rect">
+            <a:avLst/>
+          </a:prstGeom>
+        </p:spPr>
+        <p:txBody>
+          <a:bodyPr anchorCtr="0" anchor="t" bIns="91425" lIns="91425" rIns="91425" tIns="91425">
+            <a:noAutofit/>
+          </a:bodyPr>
+          <a:lstStyle/>
           <a:p>
             <a:pPr lvl="0">
               <a:spcBef>
@@ -5589,10 +6592,34 @@
               <a:buNone/>
             </a:pPr>
             <a:r>
-              <a:rPr lang="en"/>
-              <a:t>Sign up - Christina</a:t>
+              <a:t/>
             </a:r>
+            <a:endParaRPr/>
           </a:p>
+        </p:txBody>
+      </p:sp>
+      <p:sp>
+        <p:nvSpPr>
+          <p:cNvPr id="105" name="Shape 105"/>
+          <p:cNvSpPr txBox="1"/>
+          <p:nvPr>
+            <p:ph idx="1" type="body"/>
+          </p:nvPr>
+        </p:nvSpPr>
+        <p:spPr>
+          <a:xfrm>
+            <a:off x="311700" y="1152475"/>
+            <a:ext cx="8520600" cy="3416400"/>
+          </a:xfrm>
+          <a:prstGeom prst="rect">
+            <a:avLst/>
+          </a:prstGeom>
+        </p:spPr>
+        <p:txBody>
+          <a:bodyPr anchorCtr="0" anchor="t" bIns="91425" lIns="91425" rIns="91425" tIns="91425">
+            <a:noAutofit/>
+          </a:bodyPr>
+          <a:lstStyle/>
           <a:p>
             <a:pPr lvl="0">
               <a:spcBef>
@@ -5601,24 +6628,165 @@
               <a:buNone/>
             </a:pPr>
             <a:r>
-              <a:rPr lang="en"/>
-              <a:t>Sign in + Results - David</a:t>
+              <a:t/>
             </a:r>
+            <a:endParaRPr/>
           </a:p>
+        </p:txBody>
+      </p:sp>
+      <p:pic>
+        <p:nvPicPr>
+          <p:cNvPr descr="upload4.png" id="106" name="Shape 106"/>
+          <p:cNvPicPr preferRelativeResize="0"/>
+          <p:nvPr/>
+        </p:nvPicPr>
+        <p:blipFill>
+          <a:blip r:embed="rId3">
+            <a:alphaModFix/>
+          </a:blip>
+          <a:stretch>
+            <a:fillRect/>
+          </a:stretch>
+        </p:blipFill>
+        <p:spPr>
+          <a:xfrm>
+            <a:off x="0" y="0"/>
+            <a:ext cx="9143998" cy="5201779"/>
+          </a:xfrm>
+          <a:prstGeom prst="rect">
+            <a:avLst/>
+          </a:prstGeom>
+          <a:noFill/>
+          <a:ln>
+            <a:noFill/>
+          </a:ln>
+        </p:spPr>
+      </p:pic>
+    </p:spTree>
+  </p:cSld>
+  <p:clrMapOvr>
+    <a:masterClrMapping/>
+  </p:clrMapOvr>
+</p:sld>
+</file>
+
+<file path=ppt/slides/slide9.xml><?xml version="1.0" encoding="utf-8"?>
+<p:sld xmlns:a="http://schemas.openxmlformats.org/drawingml/2006/main" xmlns:r="http://schemas.openxmlformats.org/officeDocument/2006/relationships" xmlns:mc="http://schemas.openxmlformats.org/markup-compatibility/2006" xmlns:mv="urn:schemas-microsoft-com:mac:vml" xmlns:p="http://schemas.openxmlformats.org/presentationml/2006/main" xmlns:c="http://schemas.openxmlformats.org/drawingml/2006/chart" xmlns:dgm="http://schemas.openxmlformats.org/drawingml/2006/diagram" xmlns:o="urn:schemas-microsoft-com:office:office" xmlns:v="urn:schemas-microsoft-com:vml" xmlns:pvml="urn:schemas-microsoft-com:office:powerpoint" xmlns:com="http://schemas.openxmlformats.org/drawingml/2006/compatibility" xmlns:p14="http://schemas.microsoft.com/office/powerpoint/2010/main">
+  <p:cSld>
+    <p:spTree>
+      <p:nvGrpSpPr>
+        <p:cNvPr id="110" name="Shape 110"/>
+        <p:cNvGrpSpPr/>
+        <p:nvPr/>
+      </p:nvGrpSpPr>
+      <p:grpSpPr>
+        <a:xfrm>
+          <a:off x="0" y="0"/>
+          <a:ext cx="0" cy="0"/>
+          <a:chOff x="0" y="0"/>
+          <a:chExt cx="0" cy="0"/>
+        </a:xfrm>
+      </p:grpSpPr>
+      <p:sp>
+        <p:nvSpPr>
+          <p:cNvPr id="111" name="Shape 111"/>
+          <p:cNvSpPr txBox="1"/>
+          <p:nvPr>
+            <p:ph type="title"/>
+          </p:nvPr>
+        </p:nvSpPr>
+        <p:spPr>
+          <a:xfrm>
+            <a:off x="311700" y="445025"/>
+            <a:ext cx="8520600" cy="572700"/>
+          </a:xfrm>
+          <a:prstGeom prst="rect">
+            <a:avLst/>
+          </a:prstGeom>
+        </p:spPr>
+        <p:txBody>
+          <a:bodyPr anchorCtr="0" anchor="t" bIns="91425" lIns="91425" rIns="91425" tIns="91425">
+            <a:noAutofit/>
+          </a:bodyPr>
+          <a:lstStyle/>
           <a:p>
-            <a:pPr lvl="0" rtl="0">
+            <a:pPr lvl="0">
               <a:spcBef>
                 <a:spcPts val="0"/>
               </a:spcBef>
               <a:buNone/>
             </a:pPr>
             <a:r>
-              <a:rPr lang="en"/>
-              <a:t>Settings - Lewis</a:t>
+              <a:t/>
             </a:r>
+            <a:endParaRPr/>
           </a:p>
         </p:txBody>
       </p:sp>
+      <p:sp>
+        <p:nvSpPr>
+          <p:cNvPr id="112" name="Shape 112"/>
+          <p:cNvSpPr txBox="1"/>
+          <p:nvPr>
+            <p:ph idx="1" type="body"/>
+          </p:nvPr>
+        </p:nvSpPr>
+        <p:spPr>
+          <a:xfrm>
+            <a:off x="311700" y="1152475"/>
+            <a:ext cx="8520600" cy="3416400"/>
+          </a:xfrm>
+          <a:prstGeom prst="rect">
+            <a:avLst/>
+          </a:prstGeom>
+        </p:spPr>
+        <p:txBody>
+          <a:bodyPr anchorCtr="0" anchor="t" bIns="91425" lIns="91425" rIns="91425" tIns="91425">
+            <a:noAutofit/>
+          </a:bodyPr>
+          <a:lstStyle/>
+          <a:p>
+            <a:pPr lvl="0">
+              <a:spcBef>
+                <a:spcPts val="0"/>
+              </a:spcBef>
+              <a:buNone/>
+            </a:pPr>
+            <a:r>
+              <a:t/>
+            </a:r>
+            <a:endParaRPr/>
+          </a:p>
+        </p:txBody>
+      </p:sp>
+      <p:pic>
+        <p:nvPicPr>
+          <p:cNvPr descr="upload3.png" id="113" name="Shape 113"/>
+          <p:cNvPicPr preferRelativeResize="0"/>
+          <p:nvPr/>
+        </p:nvPicPr>
+        <p:blipFill>
+          <a:blip r:embed="rId3">
+            <a:alphaModFix/>
+          </a:blip>
+          <a:stretch>
+            <a:fillRect/>
+          </a:stretch>
+        </p:blipFill>
+        <p:spPr>
+          <a:xfrm>
+            <a:off x="0" y="16526"/>
+            <a:ext cx="9143998" cy="5110446"/>
+          </a:xfrm>
+          <a:prstGeom prst="rect">
+            <a:avLst/>
+          </a:prstGeom>
+          <a:noFill/>
+          <a:ln>
+            <a:noFill/>
+          </a:ln>
+        </p:spPr>
+      </p:pic>
     </p:spTree>
   </p:cSld>
   <p:clrMapOvr>
@@ -5628,6 +6796,285 @@
 </file>
 
 <file path=ppt/theme/theme1.xml><?xml version="1.0" encoding="utf-8"?>
+<a:theme xmlns:a="http://schemas.openxmlformats.org/drawingml/2006/main" xmlns:r="http://schemas.openxmlformats.org/officeDocument/2006/relationships" name="slate">
+  <a:themeElements>
+    <a:clrScheme name="Slate">
+      <a:dk1>
+        <a:srgbClr val="FFFFFF"/>
+      </a:dk1>
+      <a:lt1>
+        <a:srgbClr val="37474F"/>
+      </a:lt1>
+      <a:dk2>
+        <a:srgbClr val="9E9E9E"/>
+      </a:dk2>
+      <a:lt2>
+        <a:srgbClr val="E0E0E0"/>
+      </a:lt2>
+      <a:accent1>
+        <a:srgbClr val="616161"/>
+      </a:accent1>
+      <a:accent2>
+        <a:srgbClr val="78909C"/>
+      </a:accent2>
+      <a:accent3>
+        <a:srgbClr val="CACACA"/>
+      </a:accent3>
+      <a:accent4>
+        <a:srgbClr val="64FFDA"/>
+      </a:accent4>
+      <a:accent5>
+        <a:srgbClr val="FFD966"/>
+      </a:accent5>
+      <a:accent6>
+        <a:srgbClr val="F5F5F5"/>
+      </a:accent6>
+      <a:hlink>
+        <a:srgbClr val="FFD966"/>
+      </a:hlink>
+      <a:folHlink>
+        <a:srgbClr val="FFD966"/>
+      </a:folHlink>
+    </a:clrScheme>
+    <a:fontScheme name="Office">
+      <a:majorFont>
+        <a:latin typeface="Arial"/>
+        <a:ea typeface=""/>
+        <a:cs typeface=""/>
+        <a:font script="Jpan" typeface="ＭＳ Ｐゴシック"/>
+        <a:font script="Hang" typeface="맑은 고딕"/>
+        <a:font script="Hans" typeface="宋体"/>
+        <a:font script="Hant" typeface="新細明體"/>
+        <a:font script="Arab" typeface="Times New Roman"/>
+        <a:font script="Hebr" typeface="Times New Roman"/>
+        <a:font script="Thai" typeface="Angsana New"/>
+        <a:font script="Ethi" typeface="Nyala"/>
+        <a:font script="Beng" typeface="Vrinda"/>
+        <a:font script="Gujr" typeface="Shruti"/>
+        <a:font script="Khmr" typeface="MoolBoran"/>
+        <a:font script="Knda" typeface="Tunga"/>
+        <a:font script="Guru" typeface="Raavi"/>
+        <a:font script="Cans" typeface="Euphemia"/>
+        <a:font script="Cher" typeface="Plantagenet Cherokee"/>
+        <a:font script="Yiii" typeface="Microsoft Yi Baiti"/>
+        <a:font script="Tibt" typeface="Microsoft Himalaya"/>
+        <a:font script="Thaa" typeface="MV Boli"/>
+        <a:font script="Deva" typeface="Mangal"/>
+        <a:font script="Telu" typeface="Gautami"/>
+        <a:font script="Taml" typeface="Latha"/>
+        <a:font script="Syrc" typeface="Estrangelo Edessa"/>
+        <a:font script="Orya" typeface="Kalinga"/>
+        <a:font script="Mlym" typeface="Kartika"/>
+        <a:font script="Laoo" typeface="DokChampa"/>
+        <a:font script="Sinh" typeface="Iskoola Pota"/>
+        <a:font script="Mong" typeface="Mongolian Baiti"/>
+        <a:font script="Viet" typeface="Times New Roman"/>
+        <a:font script="Uigh" typeface="Microsoft Uighur"/>
+        <a:font script="Geor" typeface="Sylfaen"/>
+      </a:majorFont>
+      <a:minorFont>
+        <a:latin typeface="Arial"/>
+        <a:ea typeface=""/>
+        <a:cs typeface=""/>
+        <a:font script="Jpan" typeface="ＭＳ Ｐゴシック"/>
+        <a:font script="Hang" typeface="맑은 고딕"/>
+        <a:font script="Hans" typeface="宋体"/>
+        <a:font script="Hant" typeface="新細明體"/>
+        <a:font script="Arab" typeface="Arial"/>
+        <a:font script="Hebr" typeface="Arial"/>
+        <a:font script="Thai" typeface="Cordia New"/>
+        <a:font script="Ethi" typeface="Nyala"/>
+        <a:font script="Beng" typeface="Vrinda"/>
+        <a:font script="Gujr" typeface="Shruti"/>
+        <a:font script="Khmr" typeface="DaunPenh"/>
+        <a:font script="Knda" typeface="Tunga"/>
+        <a:font script="Guru" typeface="Raavi"/>
+        <a:font script="Cans" typeface="Euphemia"/>
+        <a:font script="Cher" typeface="Plantagenet Cherokee"/>
+        <a:font script="Yiii" typeface="Microsoft Yi Baiti"/>
+        <a:font script="Tibt" typeface="Microsoft Himalaya"/>
+        <a:font script="Thaa" typeface="MV Boli"/>
+        <a:font script="Deva" typeface="Mangal"/>
+        <a:font script="Telu" typeface="Gautami"/>
+        <a:font script="Taml" typeface="Latha"/>
+        <a:font script="Syrc" typeface="Estrangelo Edessa"/>
+        <a:font script="Orya" typeface="Kalinga"/>
+        <a:font script="Mlym" typeface="Kartika"/>
+        <a:font script="Laoo" typeface="DokChampa"/>
+        <a:font script="Sinh" typeface="Iskoola Pota"/>
+        <a:font script="Mong" typeface="Mongolian Baiti"/>
+        <a:font script="Viet" typeface="Arial"/>
+        <a:font script="Uigh" typeface="Microsoft Uighur"/>
+        <a:font script="Geor" typeface="Sylfaen"/>
+      </a:minorFont>
+    </a:fontScheme>
+    <a:fmtScheme name="Office">
+      <a:fillStyleLst>
+        <a:solidFill>
+          <a:schemeClr val="phClr"/>
+        </a:solidFill>
+        <a:gradFill rotWithShape="1">
+          <a:gsLst>
+            <a:gs pos="0">
+              <a:schemeClr val="phClr">
+                <a:tint val="50000"/>
+                <a:satMod val="300000"/>
+              </a:schemeClr>
+            </a:gs>
+            <a:gs pos="35000">
+              <a:schemeClr val="phClr">
+                <a:tint val="37000"/>
+                <a:satMod val="300000"/>
+              </a:schemeClr>
+            </a:gs>
+            <a:gs pos="100000">
+              <a:schemeClr val="phClr">
+                <a:tint val="15000"/>
+                <a:satMod val="350000"/>
+              </a:schemeClr>
+            </a:gs>
+          </a:gsLst>
+          <a:lin ang="16200000" scaled="1"/>
+        </a:gradFill>
+        <a:gradFill rotWithShape="1">
+          <a:gsLst>
+            <a:gs pos="0">
+              <a:schemeClr val="phClr">
+                <a:tint val="100000"/>
+                <a:shade val="100000"/>
+                <a:satMod val="130000"/>
+              </a:schemeClr>
+            </a:gs>
+            <a:gs pos="100000">
+              <a:schemeClr val="phClr">
+                <a:tint val="50000"/>
+                <a:shade val="100000"/>
+                <a:satMod val="350000"/>
+              </a:schemeClr>
+            </a:gs>
+          </a:gsLst>
+          <a:lin ang="16200000" scaled="0"/>
+        </a:gradFill>
+      </a:fillStyleLst>
+      <a:lnStyleLst>
+        <a:ln w="9525" cap="flat" cmpd="sng" algn="ctr">
+          <a:solidFill>
+            <a:schemeClr val="phClr">
+              <a:shade val="95000"/>
+              <a:satMod val="105000"/>
+            </a:schemeClr>
+          </a:solidFill>
+          <a:prstDash val="solid"/>
+        </a:ln>
+        <a:ln w="25400" cap="flat" cmpd="sng" algn="ctr">
+          <a:solidFill>
+            <a:schemeClr val="phClr"/>
+          </a:solidFill>
+          <a:prstDash val="solid"/>
+        </a:ln>
+        <a:ln w="38100" cap="flat" cmpd="sng" algn="ctr">
+          <a:solidFill>
+            <a:schemeClr val="phClr"/>
+          </a:solidFill>
+          <a:prstDash val="solid"/>
+        </a:ln>
+      </a:lnStyleLst>
+      <a:effectStyleLst>
+        <a:effectStyle>
+          <a:effectLst>
+            <a:outerShdw blurRad="40000" dist="20000" dir="5400000" rotWithShape="0">
+              <a:srgbClr val="000000">
+                <a:alpha val="38000"/>
+              </a:srgbClr>
+            </a:outerShdw>
+          </a:effectLst>
+        </a:effectStyle>
+        <a:effectStyle>
+          <a:effectLst>
+            <a:outerShdw blurRad="40000" dist="23000" dir="5400000" rotWithShape="0">
+              <a:srgbClr val="000000">
+                <a:alpha val="35000"/>
+              </a:srgbClr>
+            </a:outerShdw>
+          </a:effectLst>
+        </a:effectStyle>
+        <a:effectStyle>
+          <a:effectLst>
+            <a:outerShdw blurRad="40000" dist="23000" dir="5400000" rotWithShape="0">
+              <a:srgbClr val="000000">
+                <a:alpha val="35000"/>
+              </a:srgbClr>
+            </a:outerShdw>
+          </a:effectLst>
+          <a:scene3d>
+            <a:camera prst="orthographicFront">
+              <a:rot lat="0" lon="0" rev="0"/>
+            </a:camera>
+            <a:lightRig rig="threePt" dir="t">
+              <a:rot lat="0" lon="0" rev="1200000"/>
+            </a:lightRig>
+          </a:scene3d>
+          <a:sp3d>
+            <a:bevelT w="63500" h="25400"/>
+          </a:sp3d>
+        </a:effectStyle>
+      </a:effectStyleLst>
+      <a:bgFillStyleLst>
+        <a:solidFill>
+          <a:schemeClr val="phClr"/>
+        </a:solidFill>
+        <a:gradFill rotWithShape="1">
+          <a:gsLst>
+            <a:gs pos="0">
+              <a:schemeClr val="phClr">
+                <a:tint val="40000"/>
+                <a:satMod val="350000"/>
+              </a:schemeClr>
+            </a:gs>
+            <a:gs pos="40000">
+              <a:schemeClr val="phClr">
+                <a:tint val="45000"/>
+                <a:shade val="99000"/>
+                <a:satMod val="350000"/>
+              </a:schemeClr>
+            </a:gs>
+            <a:gs pos="100000">
+              <a:schemeClr val="phClr">
+                <a:shade val="20000"/>
+                <a:satMod val="255000"/>
+              </a:schemeClr>
+            </a:gs>
+          </a:gsLst>
+          <a:path path="circle">
+            <a:fillToRect l="50000" t="-80000" r="50000" b="180000"/>
+          </a:path>
+        </a:gradFill>
+        <a:gradFill rotWithShape="1">
+          <a:gsLst>
+            <a:gs pos="0">
+              <a:schemeClr val="phClr">
+                <a:tint val="80000"/>
+                <a:satMod val="300000"/>
+              </a:schemeClr>
+            </a:gs>
+            <a:gs pos="100000">
+              <a:schemeClr val="phClr">
+                <a:shade val="30000"/>
+                <a:satMod val="200000"/>
+              </a:schemeClr>
+            </a:gs>
+          </a:gsLst>
+          <a:path path="circle">
+            <a:fillToRect l="50000" t="50000" r="50000" b="50000"/>
+          </a:path>
+        </a:gradFill>
+      </a:bgFillStyleLst>
+    </a:fmtScheme>
+  </a:themeElements>
+</a:theme>
+</file>
+
+<file path=ppt/theme/theme2.xml><?xml version="1.0" encoding="utf-8"?>
 <a:theme xmlns:a="http://schemas.openxmlformats.org/drawingml/2006/main" xmlns:r="http://schemas.openxmlformats.org/officeDocument/2006/relationships" name="Custom Theme">
   <a:themeElements>
     <a:clrScheme name="Default">
@@ -5904,283 +7351,4 @@
     </a:fmtScheme>
   </a:themeElements>
 </a:theme>
-</file>
-
-<file path=ppt/theme/theme2.xml><?xml version="1.0" encoding="utf-8"?>
-<a:theme xmlns:a="http://schemas.openxmlformats.org/drawingml/2006/main" xmlns:r="http://schemas.openxmlformats.org/officeDocument/2006/relationships" name="slate">
-  <a:themeElements>
-    <a:clrScheme name="Slate">
-      <a:dk1>
-        <a:srgbClr val="FFFFFF"/>
-      </a:dk1>
-      <a:lt1>
-        <a:srgbClr val="37474F"/>
-      </a:lt1>
-      <a:dk2>
-        <a:srgbClr val="9E9E9E"/>
-      </a:dk2>
-      <a:lt2>
-        <a:srgbClr val="E0E0E0"/>
-      </a:lt2>
-      <a:accent1>
-        <a:srgbClr val="616161"/>
-      </a:accent1>
-      <a:accent2>
-        <a:srgbClr val="78909C"/>
-      </a:accent2>
-      <a:accent3>
-        <a:srgbClr val="CACACA"/>
-      </a:accent3>
-      <a:accent4>
-        <a:srgbClr val="64FFDA"/>
-      </a:accent4>
-      <a:accent5>
-        <a:srgbClr val="FFD966"/>
-      </a:accent5>
-      <a:accent6>
-        <a:srgbClr val="F5F5F5"/>
-      </a:accent6>
-      <a:hlink>
-        <a:srgbClr val="FFD966"/>
-      </a:hlink>
-      <a:folHlink>
-        <a:srgbClr val="FFD966"/>
-      </a:folHlink>
-    </a:clrScheme>
-    <a:fontScheme name="Office">
-      <a:majorFont>
-        <a:latin typeface="Arial"/>
-        <a:ea typeface=""/>
-        <a:cs typeface=""/>
-        <a:font script="Jpan" typeface="ＭＳ Ｐゴシック"/>
-        <a:font script="Hang" typeface="맑은 고딕"/>
-        <a:font script="Hans" typeface="宋体"/>
-        <a:font script="Hant" typeface="新細明體"/>
-        <a:font script="Arab" typeface="Times New Roman"/>
-        <a:font script="Hebr" typeface="Times New Roman"/>
-        <a:font script="Thai" typeface="Angsana New"/>
-        <a:font script="Ethi" typeface="Nyala"/>
-        <a:font script="Beng" typeface="Vrinda"/>
-        <a:font script="Gujr" typeface="Shruti"/>
-        <a:font script="Khmr" typeface="MoolBoran"/>
-        <a:font script="Knda" typeface="Tunga"/>
-        <a:font script="Guru" typeface="Raavi"/>
-        <a:font script="Cans" typeface="Euphemia"/>
-        <a:font script="Cher" typeface="Plantagenet Cherokee"/>
-        <a:font script="Yiii" typeface="Microsoft Yi Baiti"/>
-        <a:font script="Tibt" typeface="Microsoft Himalaya"/>
-        <a:font script="Thaa" typeface="MV Boli"/>
-        <a:font script="Deva" typeface="Mangal"/>
-        <a:font script="Telu" typeface="Gautami"/>
-        <a:font script="Taml" typeface="Latha"/>
-        <a:font script="Syrc" typeface="Estrangelo Edessa"/>
-        <a:font script="Orya" typeface="Kalinga"/>
-        <a:font script="Mlym" typeface="Kartika"/>
-        <a:font script="Laoo" typeface="DokChampa"/>
-        <a:font script="Sinh" typeface="Iskoola Pota"/>
-        <a:font script="Mong" typeface="Mongolian Baiti"/>
-        <a:font script="Viet" typeface="Times New Roman"/>
-        <a:font script="Uigh" typeface="Microsoft Uighur"/>
-        <a:font script="Geor" typeface="Sylfaen"/>
-      </a:majorFont>
-      <a:minorFont>
-        <a:latin typeface="Arial"/>
-        <a:ea typeface=""/>
-        <a:cs typeface=""/>
-        <a:font script="Jpan" typeface="ＭＳ Ｐゴシック"/>
-        <a:font script="Hang" typeface="맑은 고딕"/>
-        <a:font script="Hans" typeface="宋体"/>
-        <a:font script="Hant" typeface="新細明體"/>
-        <a:font script="Arab" typeface="Arial"/>
-        <a:font script="Hebr" typeface="Arial"/>
-        <a:font script="Thai" typeface="Cordia New"/>
-        <a:font script="Ethi" typeface="Nyala"/>
-        <a:font script="Beng" typeface="Vrinda"/>
-        <a:font script="Gujr" typeface="Shruti"/>
-        <a:font script="Khmr" typeface="DaunPenh"/>
-        <a:font script="Knda" typeface="Tunga"/>
-        <a:font script="Guru" typeface="Raavi"/>
-        <a:font script="Cans" typeface="Euphemia"/>
-        <a:font script="Cher" typeface="Plantagenet Cherokee"/>
-        <a:font script="Yiii" typeface="Microsoft Yi Baiti"/>
-        <a:font script="Tibt" typeface="Microsoft Himalaya"/>
-        <a:font script="Thaa" typeface="MV Boli"/>
-        <a:font script="Deva" typeface="Mangal"/>
-        <a:font script="Telu" typeface="Gautami"/>
-        <a:font script="Taml" typeface="Latha"/>
-        <a:font script="Syrc" typeface="Estrangelo Edessa"/>
-        <a:font script="Orya" typeface="Kalinga"/>
-        <a:font script="Mlym" typeface="Kartika"/>
-        <a:font script="Laoo" typeface="DokChampa"/>
-        <a:font script="Sinh" typeface="Iskoola Pota"/>
-        <a:font script="Mong" typeface="Mongolian Baiti"/>
-        <a:font script="Viet" typeface="Arial"/>
-        <a:font script="Uigh" typeface="Microsoft Uighur"/>
-        <a:font script="Geor" typeface="Sylfaen"/>
-      </a:minorFont>
-    </a:fontScheme>
-    <a:fmtScheme name="Office">
-      <a:fillStyleLst>
-        <a:solidFill>
-          <a:schemeClr val="phClr"/>
-        </a:solidFill>
-        <a:gradFill rotWithShape="1">
-          <a:gsLst>
-            <a:gs pos="0">
-              <a:schemeClr val="phClr">
-                <a:tint val="50000"/>
-                <a:satMod val="300000"/>
-              </a:schemeClr>
-            </a:gs>
-            <a:gs pos="35000">
-              <a:schemeClr val="phClr">
-                <a:tint val="37000"/>
-                <a:satMod val="300000"/>
-              </a:schemeClr>
-            </a:gs>
-            <a:gs pos="100000">
-              <a:schemeClr val="phClr">
-                <a:tint val="15000"/>
-                <a:satMod val="350000"/>
-              </a:schemeClr>
-            </a:gs>
-          </a:gsLst>
-          <a:lin ang="16200000" scaled="1"/>
-        </a:gradFill>
-        <a:gradFill rotWithShape="1">
-          <a:gsLst>
-            <a:gs pos="0">
-              <a:schemeClr val="phClr">
-                <a:tint val="100000"/>
-                <a:shade val="100000"/>
-                <a:satMod val="130000"/>
-              </a:schemeClr>
-            </a:gs>
-            <a:gs pos="100000">
-              <a:schemeClr val="phClr">
-                <a:tint val="50000"/>
-                <a:shade val="100000"/>
-                <a:satMod val="350000"/>
-              </a:schemeClr>
-            </a:gs>
-          </a:gsLst>
-          <a:lin ang="16200000" scaled="0"/>
-        </a:gradFill>
-      </a:fillStyleLst>
-      <a:lnStyleLst>
-        <a:ln w="9525" cap="flat" cmpd="sng" algn="ctr">
-          <a:solidFill>
-            <a:schemeClr val="phClr">
-              <a:shade val="95000"/>
-              <a:satMod val="105000"/>
-            </a:schemeClr>
-          </a:solidFill>
-          <a:prstDash val="solid"/>
-        </a:ln>
-        <a:ln w="25400" cap="flat" cmpd="sng" algn="ctr">
-          <a:solidFill>
-            <a:schemeClr val="phClr"/>
-          </a:solidFill>
-          <a:prstDash val="solid"/>
-        </a:ln>
-        <a:ln w="38100" cap="flat" cmpd="sng" algn="ctr">
-          <a:solidFill>
-            <a:schemeClr val="phClr"/>
-          </a:solidFill>
-          <a:prstDash val="solid"/>
-        </a:ln>
-      </a:lnStyleLst>
-      <a:effectStyleLst>
-        <a:effectStyle>
-          <a:effectLst>
-            <a:outerShdw blurRad="40000" dist="20000" dir="5400000" rotWithShape="0">
-              <a:srgbClr val="000000">
-                <a:alpha val="38000"/>
-              </a:srgbClr>
-            </a:outerShdw>
-          </a:effectLst>
-        </a:effectStyle>
-        <a:effectStyle>
-          <a:effectLst>
-            <a:outerShdw blurRad="40000" dist="23000" dir="5400000" rotWithShape="0">
-              <a:srgbClr val="000000">
-                <a:alpha val="35000"/>
-              </a:srgbClr>
-            </a:outerShdw>
-          </a:effectLst>
-        </a:effectStyle>
-        <a:effectStyle>
-          <a:effectLst>
-            <a:outerShdw blurRad="40000" dist="23000" dir="5400000" rotWithShape="0">
-              <a:srgbClr val="000000">
-                <a:alpha val="35000"/>
-              </a:srgbClr>
-            </a:outerShdw>
-          </a:effectLst>
-          <a:scene3d>
-            <a:camera prst="orthographicFront">
-              <a:rot lat="0" lon="0" rev="0"/>
-            </a:camera>
-            <a:lightRig rig="threePt" dir="t">
-              <a:rot lat="0" lon="0" rev="1200000"/>
-            </a:lightRig>
-          </a:scene3d>
-          <a:sp3d>
-            <a:bevelT w="63500" h="25400"/>
-          </a:sp3d>
-        </a:effectStyle>
-      </a:effectStyleLst>
-      <a:bgFillStyleLst>
-        <a:solidFill>
-          <a:schemeClr val="phClr"/>
-        </a:solidFill>
-        <a:gradFill rotWithShape="1">
-          <a:gsLst>
-            <a:gs pos="0">
-              <a:schemeClr val="phClr">
-                <a:tint val="40000"/>
-                <a:satMod val="350000"/>
-              </a:schemeClr>
-            </a:gs>
-            <a:gs pos="40000">
-              <a:schemeClr val="phClr">
-                <a:tint val="45000"/>
-                <a:shade val="99000"/>
-                <a:satMod val="350000"/>
-              </a:schemeClr>
-            </a:gs>
-            <a:gs pos="100000">
-              <a:schemeClr val="phClr">
-                <a:shade val="20000"/>
-                <a:satMod val="255000"/>
-              </a:schemeClr>
-            </a:gs>
-          </a:gsLst>
-          <a:path path="circle">
-            <a:fillToRect l="50000" t="-80000" r="50000" b="180000"/>
-          </a:path>
-        </a:gradFill>
-        <a:gradFill rotWithShape="1">
-          <a:gsLst>
-            <a:gs pos="0">
-              <a:schemeClr val="phClr">
-                <a:tint val="80000"/>
-                <a:satMod val="300000"/>
-              </a:schemeClr>
-            </a:gs>
-            <a:gs pos="100000">
-              <a:schemeClr val="phClr">
-                <a:shade val="30000"/>
-                <a:satMod val="200000"/>
-              </a:schemeClr>
-            </a:gs>
-          </a:gsLst>
-          <a:path path="circle">
-            <a:fillToRect l="50000" t="50000" r="50000" b="50000"/>
-          </a:path>
-        </a:gradFill>
-      </a:bgFillStyleLst>
-    </a:fmtScheme>
-  </a:themeElements>
-</a:theme>
 </file>
</xml_diff>

<commit_message>
(even more) finished powerpoint
</commit_message>
<xml_diff>
--- a/NotiFree.pptx
+++ b/NotiFree.pptx
@@ -6557,8 +6557,8 @@
         </p:nvSpPr>
         <p:spPr>
           <a:xfrm>
-            <a:off x="4829750" y="1402487"/>
-            <a:ext cx="3959400" cy="3416400"/>
+            <a:off x="3719775" y="1402500"/>
+            <a:ext cx="5069400" cy="3416400"/>
           </a:xfrm>
           <a:prstGeom prst="rect">
             <a:avLst/>
@@ -6607,6 +6607,30 @@
             <a:r>
               <a:rPr lang="en" sz="2400"/>
               <a:t>Python for getting results</a:t>
+            </a:r>
+          </a:p>
+          <a:p>
+            <a:pPr indent="-381000" lvl="0" marL="457200" rtl="0" algn="just">
+              <a:spcBef>
+                <a:spcPts val="0"/>
+              </a:spcBef>
+              <a:buSzPct val="100000"/>
+            </a:pPr>
+            <a:r>
+              <a:rPr lang="en" sz="2400"/>
+              <a:t>Apache WSGI to link to Python</a:t>
+            </a:r>
+          </a:p>
+          <a:p>
+            <a:pPr indent="-381000" lvl="0" marL="457200" rtl="0" algn="just">
+              <a:spcBef>
+                <a:spcPts val="0"/>
+              </a:spcBef>
+              <a:buSzPct val="100000"/>
+            </a:pPr>
+            <a:r>
+              <a:rPr lang="en" sz="2400"/>
+              <a:t>Cron to check for new posts</a:t>
             </a:r>
           </a:p>
           <a:p>
@@ -7241,6 +7265,285 @@
 </file>
 
 <file path=ppt/theme/theme1.xml><?xml version="1.0" encoding="utf-8"?>
+<a:theme xmlns:a="http://schemas.openxmlformats.org/drawingml/2006/main" xmlns:r="http://schemas.openxmlformats.org/officeDocument/2006/relationships" name="slate">
+  <a:themeElements>
+    <a:clrScheme name="Slate">
+      <a:dk1>
+        <a:srgbClr val="FFFFFF"/>
+      </a:dk1>
+      <a:lt1>
+        <a:srgbClr val="37474F"/>
+      </a:lt1>
+      <a:dk2>
+        <a:srgbClr val="9E9E9E"/>
+      </a:dk2>
+      <a:lt2>
+        <a:srgbClr val="E0E0E0"/>
+      </a:lt2>
+      <a:accent1>
+        <a:srgbClr val="616161"/>
+      </a:accent1>
+      <a:accent2>
+        <a:srgbClr val="78909C"/>
+      </a:accent2>
+      <a:accent3>
+        <a:srgbClr val="CACACA"/>
+      </a:accent3>
+      <a:accent4>
+        <a:srgbClr val="64FFDA"/>
+      </a:accent4>
+      <a:accent5>
+        <a:srgbClr val="FFD966"/>
+      </a:accent5>
+      <a:accent6>
+        <a:srgbClr val="F5F5F5"/>
+      </a:accent6>
+      <a:hlink>
+        <a:srgbClr val="FFD966"/>
+      </a:hlink>
+      <a:folHlink>
+        <a:srgbClr val="FFD966"/>
+      </a:folHlink>
+    </a:clrScheme>
+    <a:fontScheme name="Office">
+      <a:majorFont>
+        <a:latin typeface="Arial"/>
+        <a:ea typeface=""/>
+        <a:cs typeface=""/>
+        <a:font script="Jpan" typeface="ＭＳ Ｐゴシック"/>
+        <a:font script="Hang" typeface="맑은 고딕"/>
+        <a:font script="Hans" typeface="宋体"/>
+        <a:font script="Hant" typeface="新細明體"/>
+        <a:font script="Arab" typeface="Times New Roman"/>
+        <a:font script="Hebr" typeface="Times New Roman"/>
+        <a:font script="Thai" typeface="Angsana New"/>
+        <a:font script="Ethi" typeface="Nyala"/>
+        <a:font script="Beng" typeface="Vrinda"/>
+        <a:font script="Gujr" typeface="Shruti"/>
+        <a:font script="Khmr" typeface="MoolBoran"/>
+        <a:font script="Knda" typeface="Tunga"/>
+        <a:font script="Guru" typeface="Raavi"/>
+        <a:font script="Cans" typeface="Euphemia"/>
+        <a:font script="Cher" typeface="Plantagenet Cherokee"/>
+        <a:font script="Yiii" typeface="Microsoft Yi Baiti"/>
+        <a:font script="Tibt" typeface="Microsoft Himalaya"/>
+        <a:font script="Thaa" typeface="MV Boli"/>
+        <a:font script="Deva" typeface="Mangal"/>
+        <a:font script="Telu" typeface="Gautami"/>
+        <a:font script="Taml" typeface="Latha"/>
+        <a:font script="Syrc" typeface="Estrangelo Edessa"/>
+        <a:font script="Orya" typeface="Kalinga"/>
+        <a:font script="Mlym" typeface="Kartika"/>
+        <a:font script="Laoo" typeface="DokChampa"/>
+        <a:font script="Sinh" typeface="Iskoola Pota"/>
+        <a:font script="Mong" typeface="Mongolian Baiti"/>
+        <a:font script="Viet" typeface="Times New Roman"/>
+        <a:font script="Uigh" typeface="Microsoft Uighur"/>
+        <a:font script="Geor" typeface="Sylfaen"/>
+      </a:majorFont>
+      <a:minorFont>
+        <a:latin typeface="Arial"/>
+        <a:ea typeface=""/>
+        <a:cs typeface=""/>
+        <a:font script="Jpan" typeface="ＭＳ Ｐゴシック"/>
+        <a:font script="Hang" typeface="맑은 고딕"/>
+        <a:font script="Hans" typeface="宋体"/>
+        <a:font script="Hant" typeface="新細明體"/>
+        <a:font script="Arab" typeface="Arial"/>
+        <a:font script="Hebr" typeface="Arial"/>
+        <a:font script="Thai" typeface="Cordia New"/>
+        <a:font script="Ethi" typeface="Nyala"/>
+        <a:font script="Beng" typeface="Vrinda"/>
+        <a:font script="Gujr" typeface="Shruti"/>
+        <a:font script="Khmr" typeface="DaunPenh"/>
+        <a:font script="Knda" typeface="Tunga"/>
+        <a:font script="Guru" typeface="Raavi"/>
+        <a:font script="Cans" typeface="Euphemia"/>
+        <a:font script="Cher" typeface="Plantagenet Cherokee"/>
+        <a:font script="Yiii" typeface="Microsoft Yi Baiti"/>
+        <a:font script="Tibt" typeface="Microsoft Himalaya"/>
+        <a:font script="Thaa" typeface="MV Boli"/>
+        <a:font script="Deva" typeface="Mangal"/>
+        <a:font script="Telu" typeface="Gautami"/>
+        <a:font script="Taml" typeface="Latha"/>
+        <a:font script="Syrc" typeface="Estrangelo Edessa"/>
+        <a:font script="Orya" typeface="Kalinga"/>
+        <a:font script="Mlym" typeface="Kartika"/>
+        <a:font script="Laoo" typeface="DokChampa"/>
+        <a:font script="Sinh" typeface="Iskoola Pota"/>
+        <a:font script="Mong" typeface="Mongolian Baiti"/>
+        <a:font script="Viet" typeface="Arial"/>
+        <a:font script="Uigh" typeface="Microsoft Uighur"/>
+        <a:font script="Geor" typeface="Sylfaen"/>
+      </a:minorFont>
+    </a:fontScheme>
+    <a:fmtScheme name="Office">
+      <a:fillStyleLst>
+        <a:solidFill>
+          <a:schemeClr val="phClr"/>
+        </a:solidFill>
+        <a:gradFill rotWithShape="1">
+          <a:gsLst>
+            <a:gs pos="0">
+              <a:schemeClr val="phClr">
+                <a:tint val="50000"/>
+                <a:satMod val="300000"/>
+              </a:schemeClr>
+            </a:gs>
+            <a:gs pos="35000">
+              <a:schemeClr val="phClr">
+                <a:tint val="37000"/>
+                <a:satMod val="300000"/>
+              </a:schemeClr>
+            </a:gs>
+            <a:gs pos="100000">
+              <a:schemeClr val="phClr">
+                <a:tint val="15000"/>
+                <a:satMod val="350000"/>
+              </a:schemeClr>
+            </a:gs>
+          </a:gsLst>
+          <a:lin ang="16200000" scaled="1"/>
+        </a:gradFill>
+        <a:gradFill rotWithShape="1">
+          <a:gsLst>
+            <a:gs pos="0">
+              <a:schemeClr val="phClr">
+                <a:tint val="100000"/>
+                <a:shade val="100000"/>
+                <a:satMod val="130000"/>
+              </a:schemeClr>
+            </a:gs>
+            <a:gs pos="100000">
+              <a:schemeClr val="phClr">
+                <a:tint val="50000"/>
+                <a:shade val="100000"/>
+                <a:satMod val="350000"/>
+              </a:schemeClr>
+            </a:gs>
+          </a:gsLst>
+          <a:lin ang="16200000" scaled="0"/>
+        </a:gradFill>
+      </a:fillStyleLst>
+      <a:lnStyleLst>
+        <a:ln w="9525" cap="flat" cmpd="sng" algn="ctr">
+          <a:solidFill>
+            <a:schemeClr val="phClr">
+              <a:shade val="95000"/>
+              <a:satMod val="105000"/>
+            </a:schemeClr>
+          </a:solidFill>
+          <a:prstDash val="solid"/>
+        </a:ln>
+        <a:ln w="25400" cap="flat" cmpd="sng" algn="ctr">
+          <a:solidFill>
+            <a:schemeClr val="phClr"/>
+          </a:solidFill>
+          <a:prstDash val="solid"/>
+        </a:ln>
+        <a:ln w="38100" cap="flat" cmpd="sng" algn="ctr">
+          <a:solidFill>
+            <a:schemeClr val="phClr"/>
+          </a:solidFill>
+          <a:prstDash val="solid"/>
+        </a:ln>
+      </a:lnStyleLst>
+      <a:effectStyleLst>
+        <a:effectStyle>
+          <a:effectLst>
+            <a:outerShdw blurRad="40000" dist="20000" dir="5400000" rotWithShape="0">
+              <a:srgbClr val="000000">
+                <a:alpha val="38000"/>
+              </a:srgbClr>
+            </a:outerShdw>
+          </a:effectLst>
+        </a:effectStyle>
+        <a:effectStyle>
+          <a:effectLst>
+            <a:outerShdw blurRad="40000" dist="23000" dir="5400000" rotWithShape="0">
+              <a:srgbClr val="000000">
+                <a:alpha val="35000"/>
+              </a:srgbClr>
+            </a:outerShdw>
+          </a:effectLst>
+        </a:effectStyle>
+        <a:effectStyle>
+          <a:effectLst>
+            <a:outerShdw blurRad="40000" dist="23000" dir="5400000" rotWithShape="0">
+              <a:srgbClr val="000000">
+                <a:alpha val="35000"/>
+              </a:srgbClr>
+            </a:outerShdw>
+          </a:effectLst>
+          <a:scene3d>
+            <a:camera prst="orthographicFront">
+              <a:rot lat="0" lon="0" rev="0"/>
+            </a:camera>
+            <a:lightRig rig="threePt" dir="t">
+              <a:rot lat="0" lon="0" rev="1200000"/>
+            </a:lightRig>
+          </a:scene3d>
+          <a:sp3d>
+            <a:bevelT w="63500" h="25400"/>
+          </a:sp3d>
+        </a:effectStyle>
+      </a:effectStyleLst>
+      <a:bgFillStyleLst>
+        <a:solidFill>
+          <a:schemeClr val="phClr"/>
+        </a:solidFill>
+        <a:gradFill rotWithShape="1">
+          <a:gsLst>
+            <a:gs pos="0">
+              <a:schemeClr val="phClr">
+                <a:tint val="40000"/>
+                <a:satMod val="350000"/>
+              </a:schemeClr>
+            </a:gs>
+            <a:gs pos="40000">
+              <a:schemeClr val="phClr">
+                <a:tint val="45000"/>
+                <a:shade val="99000"/>
+                <a:satMod val="350000"/>
+              </a:schemeClr>
+            </a:gs>
+            <a:gs pos="100000">
+              <a:schemeClr val="phClr">
+                <a:shade val="20000"/>
+                <a:satMod val="255000"/>
+              </a:schemeClr>
+            </a:gs>
+          </a:gsLst>
+          <a:path path="circle">
+            <a:fillToRect l="50000" t="-80000" r="50000" b="180000"/>
+          </a:path>
+        </a:gradFill>
+        <a:gradFill rotWithShape="1">
+          <a:gsLst>
+            <a:gs pos="0">
+              <a:schemeClr val="phClr">
+                <a:tint val="80000"/>
+                <a:satMod val="300000"/>
+              </a:schemeClr>
+            </a:gs>
+            <a:gs pos="100000">
+              <a:schemeClr val="phClr">
+                <a:shade val="30000"/>
+                <a:satMod val="200000"/>
+              </a:schemeClr>
+            </a:gs>
+          </a:gsLst>
+          <a:path path="circle">
+            <a:fillToRect l="50000" t="50000" r="50000" b="50000"/>
+          </a:path>
+        </a:gradFill>
+      </a:bgFillStyleLst>
+    </a:fmtScheme>
+  </a:themeElements>
+</a:theme>
+</file>
+
+<file path=ppt/theme/theme2.xml><?xml version="1.0" encoding="utf-8"?>
 <a:theme xmlns:a="http://schemas.openxmlformats.org/drawingml/2006/main" xmlns:r="http://schemas.openxmlformats.org/officeDocument/2006/relationships" name="Custom Theme">
   <a:themeElements>
     <a:clrScheme name="Default">
@@ -7517,283 +7820,4 @@
     </a:fmtScheme>
   </a:themeElements>
 </a:theme>
-</file>
-
-<file path=ppt/theme/theme2.xml><?xml version="1.0" encoding="utf-8"?>
-<a:theme xmlns:a="http://schemas.openxmlformats.org/drawingml/2006/main" xmlns:r="http://schemas.openxmlformats.org/officeDocument/2006/relationships" name="slate">
-  <a:themeElements>
-    <a:clrScheme name="Slate">
-      <a:dk1>
-        <a:srgbClr val="FFFFFF"/>
-      </a:dk1>
-      <a:lt1>
-        <a:srgbClr val="37474F"/>
-      </a:lt1>
-      <a:dk2>
-        <a:srgbClr val="9E9E9E"/>
-      </a:dk2>
-      <a:lt2>
-        <a:srgbClr val="E0E0E0"/>
-      </a:lt2>
-      <a:accent1>
-        <a:srgbClr val="616161"/>
-      </a:accent1>
-      <a:accent2>
-        <a:srgbClr val="78909C"/>
-      </a:accent2>
-      <a:accent3>
-        <a:srgbClr val="CACACA"/>
-      </a:accent3>
-      <a:accent4>
-        <a:srgbClr val="64FFDA"/>
-      </a:accent4>
-      <a:accent5>
-        <a:srgbClr val="FFD966"/>
-      </a:accent5>
-      <a:accent6>
-        <a:srgbClr val="F5F5F5"/>
-      </a:accent6>
-      <a:hlink>
-        <a:srgbClr val="FFD966"/>
-      </a:hlink>
-      <a:folHlink>
-        <a:srgbClr val="FFD966"/>
-      </a:folHlink>
-    </a:clrScheme>
-    <a:fontScheme name="Office">
-      <a:majorFont>
-        <a:latin typeface="Arial"/>
-        <a:ea typeface=""/>
-        <a:cs typeface=""/>
-        <a:font script="Jpan" typeface="ＭＳ Ｐゴシック"/>
-        <a:font script="Hang" typeface="맑은 고딕"/>
-        <a:font script="Hans" typeface="宋体"/>
-        <a:font script="Hant" typeface="新細明體"/>
-        <a:font script="Arab" typeface="Times New Roman"/>
-        <a:font script="Hebr" typeface="Times New Roman"/>
-        <a:font script="Thai" typeface="Angsana New"/>
-        <a:font script="Ethi" typeface="Nyala"/>
-        <a:font script="Beng" typeface="Vrinda"/>
-        <a:font script="Gujr" typeface="Shruti"/>
-        <a:font script="Khmr" typeface="MoolBoran"/>
-        <a:font script="Knda" typeface="Tunga"/>
-        <a:font script="Guru" typeface="Raavi"/>
-        <a:font script="Cans" typeface="Euphemia"/>
-        <a:font script="Cher" typeface="Plantagenet Cherokee"/>
-        <a:font script="Yiii" typeface="Microsoft Yi Baiti"/>
-        <a:font script="Tibt" typeface="Microsoft Himalaya"/>
-        <a:font script="Thaa" typeface="MV Boli"/>
-        <a:font script="Deva" typeface="Mangal"/>
-        <a:font script="Telu" typeface="Gautami"/>
-        <a:font script="Taml" typeface="Latha"/>
-        <a:font script="Syrc" typeface="Estrangelo Edessa"/>
-        <a:font script="Orya" typeface="Kalinga"/>
-        <a:font script="Mlym" typeface="Kartika"/>
-        <a:font script="Laoo" typeface="DokChampa"/>
-        <a:font script="Sinh" typeface="Iskoola Pota"/>
-        <a:font script="Mong" typeface="Mongolian Baiti"/>
-        <a:font script="Viet" typeface="Times New Roman"/>
-        <a:font script="Uigh" typeface="Microsoft Uighur"/>
-        <a:font script="Geor" typeface="Sylfaen"/>
-      </a:majorFont>
-      <a:minorFont>
-        <a:latin typeface="Arial"/>
-        <a:ea typeface=""/>
-        <a:cs typeface=""/>
-        <a:font script="Jpan" typeface="ＭＳ Ｐゴシック"/>
-        <a:font script="Hang" typeface="맑은 고딕"/>
-        <a:font script="Hans" typeface="宋体"/>
-        <a:font script="Hant" typeface="新細明體"/>
-        <a:font script="Arab" typeface="Arial"/>
-        <a:font script="Hebr" typeface="Arial"/>
-        <a:font script="Thai" typeface="Cordia New"/>
-        <a:font script="Ethi" typeface="Nyala"/>
-        <a:font script="Beng" typeface="Vrinda"/>
-        <a:font script="Gujr" typeface="Shruti"/>
-        <a:font script="Khmr" typeface="DaunPenh"/>
-        <a:font script="Knda" typeface="Tunga"/>
-        <a:font script="Guru" typeface="Raavi"/>
-        <a:font script="Cans" typeface="Euphemia"/>
-        <a:font script="Cher" typeface="Plantagenet Cherokee"/>
-        <a:font script="Yiii" typeface="Microsoft Yi Baiti"/>
-        <a:font script="Tibt" typeface="Microsoft Himalaya"/>
-        <a:font script="Thaa" typeface="MV Boli"/>
-        <a:font script="Deva" typeface="Mangal"/>
-        <a:font script="Telu" typeface="Gautami"/>
-        <a:font script="Taml" typeface="Latha"/>
-        <a:font script="Syrc" typeface="Estrangelo Edessa"/>
-        <a:font script="Orya" typeface="Kalinga"/>
-        <a:font script="Mlym" typeface="Kartika"/>
-        <a:font script="Laoo" typeface="DokChampa"/>
-        <a:font script="Sinh" typeface="Iskoola Pota"/>
-        <a:font script="Mong" typeface="Mongolian Baiti"/>
-        <a:font script="Viet" typeface="Arial"/>
-        <a:font script="Uigh" typeface="Microsoft Uighur"/>
-        <a:font script="Geor" typeface="Sylfaen"/>
-      </a:minorFont>
-    </a:fontScheme>
-    <a:fmtScheme name="Office">
-      <a:fillStyleLst>
-        <a:solidFill>
-          <a:schemeClr val="phClr"/>
-        </a:solidFill>
-        <a:gradFill rotWithShape="1">
-          <a:gsLst>
-            <a:gs pos="0">
-              <a:schemeClr val="phClr">
-                <a:tint val="50000"/>
-                <a:satMod val="300000"/>
-              </a:schemeClr>
-            </a:gs>
-            <a:gs pos="35000">
-              <a:schemeClr val="phClr">
-                <a:tint val="37000"/>
-                <a:satMod val="300000"/>
-              </a:schemeClr>
-            </a:gs>
-            <a:gs pos="100000">
-              <a:schemeClr val="phClr">
-                <a:tint val="15000"/>
-                <a:satMod val="350000"/>
-              </a:schemeClr>
-            </a:gs>
-          </a:gsLst>
-          <a:lin ang="16200000" scaled="1"/>
-        </a:gradFill>
-        <a:gradFill rotWithShape="1">
-          <a:gsLst>
-            <a:gs pos="0">
-              <a:schemeClr val="phClr">
-                <a:tint val="100000"/>
-                <a:shade val="100000"/>
-                <a:satMod val="130000"/>
-              </a:schemeClr>
-            </a:gs>
-            <a:gs pos="100000">
-              <a:schemeClr val="phClr">
-                <a:tint val="50000"/>
-                <a:shade val="100000"/>
-                <a:satMod val="350000"/>
-              </a:schemeClr>
-            </a:gs>
-          </a:gsLst>
-          <a:lin ang="16200000" scaled="0"/>
-        </a:gradFill>
-      </a:fillStyleLst>
-      <a:lnStyleLst>
-        <a:ln w="9525" cap="flat" cmpd="sng" algn="ctr">
-          <a:solidFill>
-            <a:schemeClr val="phClr">
-              <a:shade val="95000"/>
-              <a:satMod val="105000"/>
-            </a:schemeClr>
-          </a:solidFill>
-          <a:prstDash val="solid"/>
-        </a:ln>
-        <a:ln w="25400" cap="flat" cmpd="sng" algn="ctr">
-          <a:solidFill>
-            <a:schemeClr val="phClr"/>
-          </a:solidFill>
-          <a:prstDash val="solid"/>
-        </a:ln>
-        <a:ln w="38100" cap="flat" cmpd="sng" algn="ctr">
-          <a:solidFill>
-            <a:schemeClr val="phClr"/>
-          </a:solidFill>
-          <a:prstDash val="solid"/>
-        </a:ln>
-      </a:lnStyleLst>
-      <a:effectStyleLst>
-        <a:effectStyle>
-          <a:effectLst>
-            <a:outerShdw blurRad="40000" dist="20000" dir="5400000" rotWithShape="0">
-              <a:srgbClr val="000000">
-                <a:alpha val="38000"/>
-              </a:srgbClr>
-            </a:outerShdw>
-          </a:effectLst>
-        </a:effectStyle>
-        <a:effectStyle>
-          <a:effectLst>
-            <a:outerShdw blurRad="40000" dist="23000" dir="5400000" rotWithShape="0">
-              <a:srgbClr val="000000">
-                <a:alpha val="35000"/>
-              </a:srgbClr>
-            </a:outerShdw>
-          </a:effectLst>
-        </a:effectStyle>
-        <a:effectStyle>
-          <a:effectLst>
-            <a:outerShdw blurRad="40000" dist="23000" dir="5400000" rotWithShape="0">
-              <a:srgbClr val="000000">
-                <a:alpha val="35000"/>
-              </a:srgbClr>
-            </a:outerShdw>
-          </a:effectLst>
-          <a:scene3d>
-            <a:camera prst="orthographicFront">
-              <a:rot lat="0" lon="0" rev="0"/>
-            </a:camera>
-            <a:lightRig rig="threePt" dir="t">
-              <a:rot lat="0" lon="0" rev="1200000"/>
-            </a:lightRig>
-          </a:scene3d>
-          <a:sp3d>
-            <a:bevelT w="63500" h="25400"/>
-          </a:sp3d>
-        </a:effectStyle>
-      </a:effectStyleLst>
-      <a:bgFillStyleLst>
-        <a:solidFill>
-          <a:schemeClr val="phClr"/>
-        </a:solidFill>
-        <a:gradFill rotWithShape="1">
-          <a:gsLst>
-            <a:gs pos="0">
-              <a:schemeClr val="phClr">
-                <a:tint val="40000"/>
-                <a:satMod val="350000"/>
-              </a:schemeClr>
-            </a:gs>
-            <a:gs pos="40000">
-              <a:schemeClr val="phClr">
-                <a:tint val="45000"/>
-                <a:shade val="99000"/>
-                <a:satMod val="350000"/>
-              </a:schemeClr>
-            </a:gs>
-            <a:gs pos="100000">
-              <a:schemeClr val="phClr">
-                <a:shade val="20000"/>
-                <a:satMod val="255000"/>
-              </a:schemeClr>
-            </a:gs>
-          </a:gsLst>
-          <a:path path="circle">
-            <a:fillToRect l="50000" t="-80000" r="50000" b="180000"/>
-          </a:path>
-        </a:gradFill>
-        <a:gradFill rotWithShape="1">
-          <a:gsLst>
-            <a:gs pos="0">
-              <a:schemeClr val="phClr">
-                <a:tint val="80000"/>
-                <a:satMod val="300000"/>
-              </a:schemeClr>
-            </a:gs>
-            <a:gs pos="100000">
-              <a:schemeClr val="phClr">
-                <a:shade val="30000"/>
-                <a:satMod val="200000"/>
-              </a:schemeClr>
-            </a:gs>
-          </a:gsLst>
-          <a:path path="circle">
-            <a:fillToRect l="50000" t="50000" r="50000" b="50000"/>
-          </a:path>
-        </a:gradFill>
-      </a:bgFillStyleLst>
-    </a:fmtScheme>
-  </a:themeElements>
-</a:theme>
 </file>
</xml_diff>